<commit_message>
Adição de foto e nome na apresentação
</commit_message>
<xml_diff>
--- a/Modelo Imobiliário.pptx
+++ b/Modelo Imobiliário.pptx
@@ -246,7 +246,7 @@
             <a:pPr rtl="0"/>
             <a:fld id="{725FB956-6D4A-42A4-8922-04A0471F5626}" type="datetime1">
               <a:rPr lang="pt-BR" smtClean="0"/>
-              <a:t>25/05/2022</a:t>
+              <a:t>15/06/2022</a:t>
             </a:fld>
             <a:endParaRPr lang="pt-BR"/>
           </a:p>
@@ -428,7 +428,7 @@
             <a:pPr rtl="0"/>
             <a:fld id="{D8414BCE-8E15-4FAC-ABEA-824CFE89BEEF}" type="datetime1">
               <a:rPr lang="pt-BR" smtClean="0"/>
-              <a:t>25/05/2022</a:t>
+              <a:t>15/06/2022</a:t>
             </a:fld>
             <a:endParaRPr lang="pt-BR"/>
           </a:p>
@@ -796,7 +796,7 @@
             <a:pPr rtl="0"/>
             <a:fld id="{1A551632-2A86-4E22-BFB5-628C43F0EF2D}" type="datetime1">
               <a:rPr lang="pt-BR" smtClean="0"/>
-              <a:t>25/05/2022</a:t>
+              <a:t>15/06/2022</a:t>
             </a:fld>
             <a:endParaRPr lang="pt-BR"/>
           </a:p>
@@ -912,7 +912,7 @@
             <a:pPr rtl="0"/>
             <a:fld id="{93A4E31E-6660-495C-8AF7-2B626A7C13ED}" type="datetime1">
               <a:rPr lang="pt-BR" smtClean="0"/>
-              <a:t>25/05/2022</a:t>
+              <a:t>15/06/2022</a:t>
             </a:fld>
             <a:endParaRPr lang="pt-BR"/>
           </a:p>
@@ -1027,7 +1027,7 @@
             <a:pPr rtl="0"/>
             <a:fld id="{EC9C0863-7EBF-4A41-9068-6912EB84D0A6}" type="datetime1">
               <a:rPr lang="pt-BR" smtClean="0"/>
-              <a:t>25/05/2022</a:t>
+              <a:t>15/06/2022</a:t>
             </a:fld>
             <a:endParaRPr lang="pt-BR"/>
           </a:p>
@@ -1143,7 +1143,7 @@
             <a:pPr rtl="0"/>
             <a:fld id="{67F745A1-738E-46EE-BF5D-12C6CA92B110}" type="datetime1">
               <a:rPr lang="pt-BR" smtClean="0"/>
-              <a:t>25/05/2022</a:t>
+              <a:t>15/06/2022</a:t>
             </a:fld>
             <a:endParaRPr lang="pt-BR"/>
           </a:p>
@@ -1259,7 +1259,7 @@
             <a:pPr rtl="0"/>
             <a:fld id="{EA7884E1-E9A7-49A0-9859-61B5DC8D7B92}" type="datetime1">
               <a:rPr lang="pt-BR" smtClean="0"/>
-              <a:t>25/05/2022</a:t>
+              <a:t>15/06/2022</a:t>
             </a:fld>
             <a:endParaRPr lang="pt-BR"/>
           </a:p>
@@ -1375,7 +1375,7 @@
             <a:pPr rtl="0"/>
             <a:fld id="{EA7884E1-E9A7-49A0-9859-61B5DC8D7B92}" type="datetime1">
               <a:rPr lang="pt-BR" smtClean="0"/>
-              <a:t>25/05/2022</a:t>
+              <a:t>15/06/2022</a:t>
             </a:fld>
             <a:endParaRPr lang="pt-BR"/>
           </a:p>
@@ -1491,7 +1491,7 @@
             <a:pPr rtl="0"/>
             <a:fld id="{EA7884E1-E9A7-49A0-9859-61B5DC8D7B92}" type="datetime1">
               <a:rPr lang="pt-BR" smtClean="0"/>
-              <a:t>25/05/2022</a:t>
+              <a:t>15/06/2022</a:t>
             </a:fld>
             <a:endParaRPr lang="pt-BR"/>
           </a:p>
@@ -1607,7 +1607,7 @@
             <a:pPr rtl="0"/>
             <a:fld id="{EA7884E1-E9A7-49A0-9859-61B5DC8D7B92}" type="datetime1">
               <a:rPr lang="pt-BR" smtClean="0"/>
-              <a:t>25/05/2022</a:t>
+              <a:t>15/06/2022</a:t>
             </a:fld>
             <a:endParaRPr lang="pt-BR"/>
           </a:p>
@@ -1723,7 +1723,7 @@
             <a:pPr rtl="0"/>
             <a:fld id="{EA7884E1-E9A7-49A0-9859-61B5DC8D7B92}" type="datetime1">
               <a:rPr lang="pt-BR" smtClean="0"/>
-              <a:t>25/05/2022</a:t>
+              <a:t>15/06/2022</a:t>
             </a:fld>
             <a:endParaRPr lang="pt-BR"/>
           </a:p>
@@ -13985,12 +13985,12 @@
         <p:spPr>
           <a:xfrm>
             <a:off x="7999413" y="3678222"/>
-            <a:ext cx="3565524" cy="1731963"/>
+            <a:ext cx="3565524" cy="2185683"/>
           </a:xfrm>
         </p:spPr>
         <p:txBody>
           <a:bodyPr rtlCol="0">
-            <a:normAutofit fontScale="92500" lnSpcReduction="20000"/>
+            <a:normAutofit fontScale="85000" lnSpcReduction="20000"/>
           </a:bodyPr>
           <a:lstStyle/>
           <a:p>
@@ -14030,6 +14030,15 @@
               <a:rPr lang="pt-BR" dirty="0" err="1"/>
               <a:t>Yoshimura</a:t>
             </a:r>
+            <a:endParaRPr lang="pt-BR" dirty="0"/>
+          </a:p>
+          <a:p>
+            <a:r>
+              <a:rPr lang="pt-BR" dirty="0"/>
+              <a:t>Letícia Rossaneis</a:t>
+            </a:r>
+          </a:p>
+          <a:p>
             <a:endParaRPr lang="pt-BR" dirty="0"/>
           </a:p>
         </p:txBody>
@@ -18302,7 +18311,7 @@
         </p:blipFill>
         <p:spPr>
           <a:xfrm>
-            <a:off x="955755" y="1974499"/>
+            <a:off x="1042171" y="2007532"/>
             <a:ext cx="1584540" cy="1584540"/>
           </a:xfrm>
         </p:spPr>
@@ -18325,8 +18334,8 @@
         </p:nvSpPr>
         <p:spPr>
           <a:xfrm>
-            <a:off x="9433112" y="3787288"/>
-            <a:ext cx="2014532" cy="359897"/>
+            <a:off x="7162046" y="3794549"/>
+            <a:ext cx="1830952" cy="359897"/>
           </a:xfrm>
         </p:spPr>
         <p:txBody>
@@ -18364,8 +18373,8 @@
         </p:nvSpPr>
         <p:spPr>
           <a:xfrm>
-            <a:off x="6761256" y="3761558"/>
-            <a:ext cx="2014532" cy="257175"/>
+            <a:off x="5206453" y="3825730"/>
+            <a:ext cx="1711325" cy="257175"/>
           </a:xfrm>
         </p:spPr>
         <p:txBody>
@@ -18462,7 +18471,7 @@
         </p:blipFill>
         <p:spPr>
           <a:xfrm>
-            <a:off x="3839151" y="1974499"/>
+            <a:off x="3191509" y="1997545"/>
             <a:ext cx="1584540" cy="1584540"/>
           </a:xfrm>
           <a:prstGeom prst="rect">
@@ -18492,7 +18501,7 @@
         </p:blipFill>
         <p:spPr>
           <a:xfrm>
-            <a:off x="6870066" y="1974499"/>
+            <a:off x="5340847" y="2007532"/>
             <a:ext cx="1396480" cy="1584540"/>
           </a:xfrm>
           <a:prstGeom prst="rect">
@@ -18521,7 +18530,7 @@
         </p:blipFill>
         <p:spPr>
           <a:xfrm>
-            <a:off x="9433112" y="1974499"/>
+            <a:off x="7302125" y="2017389"/>
             <a:ext cx="1434006" cy="1584540"/>
           </a:xfrm>
           <a:prstGeom prst="rect">
@@ -18545,7 +18554,7 @@
         </p:nvSpPr>
         <p:spPr>
           <a:xfrm>
-            <a:off x="3839151" y="3781425"/>
+            <a:off x="3157229" y="3771438"/>
             <a:ext cx="1711325" cy="365760"/>
           </a:xfrm>
           <a:prstGeom prst="rect">
@@ -18770,7 +18779,7 @@
         </p:nvSpPr>
         <p:spPr>
           <a:xfrm>
-            <a:off x="1042171" y="3781425"/>
+            <a:off x="1151228" y="3771438"/>
             <a:ext cx="1711325" cy="365760"/>
           </a:xfrm>
           <a:prstGeom prst="rect">
@@ -18974,6 +18983,260 @@
             <a:r>
               <a:rPr lang="pt-BR" dirty="0"/>
               <a:t>Lídia Souza</a:t>
+            </a:r>
+          </a:p>
+        </p:txBody>
+      </p:sp>
+      <p:pic>
+        <p:nvPicPr>
+          <p:cNvPr id="3" name="Imagem 2" descr="Rosto de mulher visto de perto&#10;&#10;Descrição gerada automaticamente com confiança média">
+            <a:extLst>
+              <a:ext uri="{FF2B5EF4-FFF2-40B4-BE49-F238E27FC236}">
+                <a16:creationId xmlns:a16="http://schemas.microsoft.com/office/drawing/2014/main" id="{993FA805-A47B-91F3-EDA0-67B80B1A8BD2}"/>
+              </a:ext>
+            </a:extLst>
+          </p:cNvPr>
+          <p:cNvPicPr>
+            <a:picLocks noChangeAspect="1"/>
+          </p:cNvPicPr>
+          <p:nvPr/>
+        </p:nvPicPr>
+        <p:blipFill>
+          <a:blip r:embed="rId7"/>
+          <a:stretch>
+            <a:fillRect/>
+          </a:stretch>
+        </p:blipFill>
+        <p:spPr>
+          <a:xfrm rot="5400000">
+            <a:off x="9300929" y="1997545"/>
+            <a:ext cx="1584000" cy="1584000"/>
+          </a:xfrm>
+          <a:prstGeom prst="rect">
+            <a:avLst/>
+          </a:prstGeom>
+        </p:spPr>
+      </p:pic>
+      <p:sp>
+        <p:nvSpPr>
+          <p:cNvPr id="15" name="Espaço Reservado para Texto 40">
+            <a:extLst>
+              <a:ext uri="{FF2B5EF4-FFF2-40B4-BE49-F238E27FC236}">
+                <a16:creationId xmlns:a16="http://schemas.microsoft.com/office/drawing/2014/main" id="{156ACF78-45FE-D3F7-3E43-CE6059AAE64E}"/>
+              </a:ext>
+            </a:extLst>
+          </p:cNvPr>
+          <p:cNvSpPr txBox="1">
+            <a:spLocks/>
+          </p:cNvSpPr>
+          <p:nvPr/>
+        </p:nvSpPr>
+        <p:spPr>
+          <a:xfrm>
+            <a:off x="9237266" y="3825730"/>
+            <a:ext cx="1803506" cy="365760"/>
+          </a:xfrm>
+          <a:prstGeom prst="rect">
+            <a:avLst/>
+          </a:prstGeom>
+        </p:spPr>
+        <p:txBody>
+          <a:bodyPr vert="horz" wrap="square" lIns="0" tIns="0" rIns="0" bIns="0" rtlCol="0">
+            <a:noAutofit/>
+          </a:bodyPr>
+          <a:lstStyle>
+            <a:lvl1pPr marL="228600" indent="-228600" algn="l" defTabSz="914400" rtl="0" eaLnBrk="1" latinLnBrk="0" hangingPunct="1">
+              <a:lnSpc>
+                <a:spcPct val="110000"/>
+              </a:lnSpc>
+              <a:spcBef>
+                <a:spcPts val="1000"/>
+              </a:spcBef>
+              <a:spcAft>
+                <a:spcPts val="800"/>
+              </a:spcAft>
+              <a:buFont typeface="Arial" panose="020B0604020202020204" pitchFamily="34" charset="0"/>
+              <a:buNone/>
+              <a:defRPr sz="2000" b="1" kern="1200">
+                <a:solidFill>
+                  <a:schemeClr val="tx1">
+                    <a:alpha val="60000"/>
+                  </a:schemeClr>
+                </a:solidFill>
+                <a:latin typeface="+mn-lt"/>
+                <a:ea typeface="+mn-ea"/>
+                <a:cs typeface="+mn-cs"/>
+              </a:defRPr>
+            </a:lvl1pPr>
+            <a:lvl2pPr marL="685800" indent="-228600" algn="l" defTabSz="914400" rtl="0" eaLnBrk="1" latinLnBrk="0" hangingPunct="1">
+              <a:lnSpc>
+                <a:spcPct val="110000"/>
+              </a:lnSpc>
+              <a:spcBef>
+                <a:spcPts val="500"/>
+              </a:spcBef>
+              <a:spcAft>
+                <a:spcPts val="800"/>
+              </a:spcAft>
+              <a:buFont typeface="Arial" panose="020B0604020202020204" pitchFamily="34" charset="0"/>
+              <a:buChar char="•"/>
+              <a:defRPr sz="1400" kern="1200">
+                <a:solidFill>
+                  <a:schemeClr val="tx1">
+                    <a:alpha val="60000"/>
+                  </a:schemeClr>
+                </a:solidFill>
+                <a:latin typeface="+mn-lt"/>
+                <a:ea typeface="+mn-ea"/>
+                <a:cs typeface="+mn-cs"/>
+              </a:defRPr>
+            </a:lvl2pPr>
+            <a:lvl3pPr marL="1143000" indent="-228600" algn="l" defTabSz="914400" rtl="0" eaLnBrk="1" latinLnBrk="0" hangingPunct="1">
+              <a:lnSpc>
+                <a:spcPct val="110000"/>
+              </a:lnSpc>
+              <a:spcBef>
+                <a:spcPts val="500"/>
+              </a:spcBef>
+              <a:spcAft>
+                <a:spcPts val="800"/>
+              </a:spcAft>
+              <a:buFont typeface="Arial" panose="020B0604020202020204" pitchFamily="34" charset="0"/>
+              <a:buChar char="•"/>
+              <a:defRPr sz="1400" kern="1200">
+                <a:solidFill>
+                  <a:schemeClr val="tx1">
+                    <a:alpha val="60000"/>
+                  </a:schemeClr>
+                </a:solidFill>
+                <a:latin typeface="+mn-lt"/>
+                <a:ea typeface="+mn-ea"/>
+                <a:cs typeface="+mn-cs"/>
+              </a:defRPr>
+            </a:lvl3pPr>
+            <a:lvl4pPr marL="1600200" indent="-228600" algn="l" defTabSz="914400" rtl="0" eaLnBrk="1" latinLnBrk="0" hangingPunct="1">
+              <a:lnSpc>
+                <a:spcPct val="110000"/>
+              </a:lnSpc>
+              <a:spcBef>
+                <a:spcPts val="500"/>
+              </a:spcBef>
+              <a:spcAft>
+                <a:spcPts val="800"/>
+              </a:spcAft>
+              <a:buFont typeface="Arial" panose="020B0604020202020204" pitchFamily="34" charset="0"/>
+              <a:buChar char="•"/>
+              <a:defRPr sz="1400" kern="1200">
+                <a:solidFill>
+                  <a:schemeClr val="tx1">
+                    <a:alpha val="60000"/>
+                  </a:schemeClr>
+                </a:solidFill>
+                <a:latin typeface="+mn-lt"/>
+                <a:ea typeface="+mn-ea"/>
+                <a:cs typeface="+mn-cs"/>
+              </a:defRPr>
+            </a:lvl4pPr>
+            <a:lvl5pPr marL="2057400" indent="-228600" algn="l" defTabSz="914400" rtl="0" eaLnBrk="1" latinLnBrk="0" hangingPunct="1">
+              <a:lnSpc>
+                <a:spcPct val="110000"/>
+              </a:lnSpc>
+              <a:spcBef>
+                <a:spcPts val="500"/>
+              </a:spcBef>
+              <a:spcAft>
+                <a:spcPts val="800"/>
+              </a:spcAft>
+              <a:buFont typeface="Arial" panose="020B0604020202020204" pitchFamily="34" charset="0"/>
+              <a:buChar char="•"/>
+              <a:defRPr sz="1400" kern="1200">
+                <a:solidFill>
+                  <a:schemeClr val="tx1">
+                    <a:alpha val="60000"/>
+                  </a:schemeClr>
+                </a:solidFill>
+                <a:latin typeface="+mn-lt"/>
+                <a:ea typeface="+mn-ea"/>
+                <a:cs typeface="+mn-cs"/>
+              </a:defRPr>
+            </a:lvl5pPr>
+            <a:lvl6pPr marL="2514600" indent="-228600" algn="l" defTabSz="914400" rtl="0" eaLnBrk="1" latinLnBrk="0" hangingPunct="1">
+              <a:lnSpc>
+                <a:spcPct val="90000"/>
+              </a:lnSpc>
+              <a:spcBef>
+                <a:spcPts val="500"/>
+              </a:spcBef>
+              <a:buFont typeface="Arial" panose="020B0604020202020204" pitchFamily="34" charset="0"/>
+              <a:buChar char="•"/>
+              <a:defRPr sz="1800" kern="1200">
+                <a:solidFill>
+                  <a:schemeClr val="tx1"/>
+                </a:solidFill>
+                <a:latin typeface="+mn-lt"/>
+                <a:ea typeface="+mn-ea"/>
+                <a:cs typeface="+mn-cs"/>
+              </a:defRPr>
+            </a:lvl6pPr>
+            <a:lvl7pPr marL="2971800" indent="-228600" algn="l" defTabSz="914400" rtl="0" eaLnBrk="1" latinLnBrk="0" hangingPunct="1">
+              <a:lnSpc>
+                <a:spcPct val="90000"/>
+              </a:lnSpc>
+              <a:spcBef>
+                <a:spcPts val="500"/>
+              </a:spcBef>
+              <a:buFont typeface="Arial" panose="020B0604020202020204" pitchFamily="34" charset="0"/>
+              <a:buChar char="•"/>
+              <a:defRPr sz="1800" kern="1200">
+                <a:solidFill>
+                  <a:schemeClr val="tx1"/>
+                </a:solidFill>
+                <a:latin typeface="+mn-lt"/>
+                <a:ea typeface="+mn-ea"/>
+                <a:cs typeface="+mn-cs"/>
+              </a:defRPr>
+            </a:lvl7pPr>
+            <a:lvl8pPr marL="3429000" indent="-228600" algn="l" defTabSz="914400" rtl="0" eaLnBrk="1" latinLnBrk="0" hangingPunct="1">
+              <a:lnSpc>
+                <a:spcPct val="90000"/>
+              </a:lnSpc>
+              <a:spcBef>
+                <a:spcPts val="500"/>
+              </a:spcBef>
+              <a:buFont typeface="Arial" panose="020B0604020202020204" pitchFamily="34" charset="0"/>
+              <a:buChar char="•"/>
+              <a:defRPr sz="1800" kern="1200">
+                <a:solidFill>
+                  <a:schemeClr val="tx1"/>
+                </a:solidFill>
+                <a:latin typeface="+mn-lt"/>
+                <a:ea typeface="+mn-ea"/>
+                <a:cs typeface="+mn-cs"/>
+              </a:defRPr>
+            </a:lvl8pPr>
+            <a:lvl9pPr marL="3886200" indent="-228600" algn="l" defTabSz="914400" rtl="0" eaLnBrk="1" latinLnBrk="0" hangingPunct="1">
+              <a:lnSpc>
+                <a:spcPct val="90000"/>
+              </a:lnSpc>
+              <a:spcBef>
+                <a:spcPts val="500"/>
+              </a:spcBef>
+              <a:buFont typeface="Arial" panose="020B0604020202020204" pitchFamily="34" charset="0"/>
+              <a:buChar char="•"/>
+              <a:defRPr sz="1800" kern="1200">
+                <a:solidFill>
+                  <a:schemeClr val="tx1"/>
+                </a:solidFill>
+                <a:latin typeface="+mn-lt"/>
+                <a:ea typeface="+mn-ea"/>
+                <a:cs typeface="+mn-cs"/>
+              </a:defRPr>
+            </a:lvl9pPr>
+          </a:lstStyle>
+          <a:p>
+            <a:r>
+              <a:rPr lang="pt-BR" sz="1800" dirty="0"/>
+              <a:t>Letícia Rossaneis</a:t>
             </a:r>
           </a:p>
         </p:txBody>
@@ -22886,6 +23149,15 @@
 </file>
 
 <file path=customXml/item2.xml><?xml version="1.0" encoding="utf-8"?>
+<?mso-contentType ?>
+<FormTemplates xmlns="http://schemas.microsoft.com/sharepoint/v3/contenttype/forms">
+  <Display>DocumentLibraryForm</Display>
+  <Edit>DocumentLibraryForm</Edit>
+  <New>DocumentLibraryForm</New>
+</FormTemplates>
+</file>
+
+<file path=customXml/item3.xml><?xml version="1.0" encoding="utf-8"?>
 <p:properties xmlns:p="http://schemas.microsoft.com/office/2006/metadata/properties" xmlns:xsi="http://www.w3.org/2001/XMLSchema-instance" xmlns:pc="http://schemas.microsoft.com/office/infopath/2007/PartnerControls">
   <documentManagement>
     <_ip_UnifiedCompliancePolicyUIAction xmlns="http://schemas.microsoft.com/sharepoint/v3" xsi:nil="true"/>
@@ -22902,15 +23174,6 @@
     <MediaServiceKeyPoints xmlns="71af3243-3dd4-4a8d-8c0d-dd76da1f02a5" xsi:nil="true"/>
   </documentManagement>
 </p:properties>
-</file>
-
-<file path=customXml/item3.xml><?xml version="1.0" encoding="utf-8"?>
-<?mso-contentType ?>
-<FormTemplates xmlns="http://schemas.microsoft.com/sharepoint/v3/contenttype/forms">
-  <Display>DocumentLibraryForm</Display>
-  <Edit>DocumentLibraryForm</Edit>
-  <New>DocumentLibraryForm</New>
-</FormTemplates>
 </file>
 
 <file path=customXml/itemProps1.xml><?xml version="1.0" encoding="utf-8"?>
@@ -22935,6 +23198,14 @@
 </file>
 
 <file path=customXml/itemProps2.xml><?xml version="1.0" encoding="utf-8"?>
+<ds:datastoreItem xmlns:ds="http://schemas.openxmlformats.org/officeDocument/2006/customXml" ds:itemID="{904751AB-E840-446F-8D49-E697067EC887}">
+  <ds:schemaRefs>
+    <ds:schemaRef ds:uri="http://schemas.microsoft.com/sharepoint/v3/contenttype/forms"/>
+  </ds:schemaRefs>
+</ds:datastoreItem>
+</file>
+
+<file path=customXml/itemProps3.xml><?xml version="1.0" encoding="utf-8"?>
 <ds:datastoreItem xmlns:ds="http://schemas.openxmlformats.org/officeDocument/2006/customXml" ds:itemID="{50811A92-D464-4AC4-A396-BA73B10CEEAC}">
   <ds:schemaRefs>
     <ds:schemaRef ds:uri="http://schemas.microsoft.com/office/2006/metadata/properties"/>
@@ -22946,14 +23217,6 @@
 </ds:datastoreItem>
 </file>
 
-<file path=customXml/itemProps3.xml><?xml version="1.0" encoding="utf-8"?>
-<ds:datastoreItem xmlns:ds="http://schemas.openxmlformats.org/officeDocument/2006/customXml" ds:itemID="{904751AB-E840-446F-8D49-E697067EC887}">
-  <ds:schemaRefs>
-    <ds:schemaRef ds:uri="http://schemas.microsoft.com/sharepoint/v3/contenttype/forms"/>
-  </ds:schemaRefs>
-</ds:datastoreItem>
-</file>
-
 <file path=docMetadata/LabelInfo.xml><?xml version="1.0" encoding="utf-8"?>
 <clbl:labelList xmlns:clbl="http://schemas.microsoft.com/office/2020/mipLabelMetadata">
   <clbl:label id="{5fae8262-b78e-4366-8929-a5d6aac95320}" enabled="1" method="Standard" siteId="{cf36141c-ddd7-45a7-b073-111f66d0b30c}" contentBits="0" removed="0"/>

</xml_diff>

<commit_message>
Modelo de Regressão Linear – Múltipla
</commit_message>
<xml_diff>
--- a/Modelo Imobiliário.pptx
+++ b/Modelo Imobiliário.pptx
@@ -21,9 +21,9 @@
     <p:sldId id="300" r:id="rId12"/>
     <p:sldId id="284" r:id="rId13"/>
     <p:sldId id="311" r:id="rId14"/>
-    <p:sldId id="310" r:id="rId15"/>
-    <p:sldId id="319" r:id="rId16"/>
-    <p:sldId id="312" r:id="rId17"/>
+    <p:sldId id="312" r:id="rId15"/>
+    <p:sldId id="310" r:id="rId16"/>
+    <p:sldId id="319" r:id="rId17"/>
     <p:sldId id="309" r:id="rId18"/>
     <p:sldId id="313" r:id="rId19"/>
     <p:sldId id="316" r:id="rId20"/>
@@ -131,7 +131,13 @@
   </p:defaultTextStyle>
   <p:extLst>
     <p:ext uri="{EFAFB233-063F-42B5-8137-9DF3F51BA10A}">
-      <p15:sldGuideLst xmlns:p15="http://schemas.microsoft.com/office/powerpoint/2012/main"/>
+      <p15:sldGuideLst xmlns:p15="http://schemas.microsoft.com/office/powerpoint/2012/main">
+        <p15:guide id="1" pos="3840" userDrawn="1">
+          <p15:clr>
+            <a:srgbClr val="A4A3A4"/>
+          </p15:clr>
+        </p15:guide>
+      </p15:sldGuideLst>
     </p:ext>
     <p:ext uri="{2D200454-40CA-4A62-9FC3-DE9A4176ACB9}">
       <p15:notesGuideLst xmlns:p15="http://schemas.microsoft.com/office/powerpoint/2012/main"/>
@@ -2356,7 +2362,7 @@
             <a:pPr rtl="0"/>
             <a:fld id="{F07F282E-55F5-4803-B60F-09BA4600E538}" type="slidenum">
               <a:rPr lang="pt-BR" smtClean="0"/>
-              <a:t>11</a:t>
+              <a:t>12</a:t>
             </a:fld>
             <a:endParaRPr lang="pt-BR" dirty="0"/>
           </a:p>
@@ -11282,14 +11288,14 @@
         </p:spPr>
         <p:txBody>
           <a:bodyPr rtlCol="0">
-            <a:normAutofit fontScale="90000"/>
+            <a:normAutofit/>
           </a:bodyPr>
           <a:lstStyle/>
           <a:p>
             <a:pPr rtl="0"/>
             <a:r>
               <a:rPr lang="pt-BR" dirty="0"/>
-              <a:t>Modelo de Regressão Linear – Múltipla 1</a:t>
+              <a:t>Modelo de Regressão Linear – Múltipla </a:t>
             </a:r>
           </a:p>
         </p:txBody>
@@ -11346,8 +11352,955 @@
         </p:nvSpPr>
         <p:spPr>
           <a:xfrm>
+            <a:off x="1183133" y="2801923"/>
+            <a:ext cx="10712456" cy="3967993"/>
+          </a:xfrm>
+          <a:prstGeom prst="rect">
+            <a:avLst/>
+          </a:prstGeom>
+        </p:spPr>
+        <p:txBody>
+          <a:bodyPr numCol="2" rtlCol="0"/>
+          <a:lstStyle>
+            <a:lvl1pPr marL="0" indent="0" algn="l" defTabSz="914400" rtl="0" eaLnBrk="1" latinLnBrk="0" hangingPunct="1">
+              <a:lnSpc>
+                <a:spcPct val="140000"/>
+              </a:lnSpc>
+              <a:spcBef>
+                <a:spcPts val="930"/>
+              </a:spcBef>
+              <a:buFont typeface="Corbel" panose="020B0503020204020204" pitchFamily="34" charset="0"/>
+              <a:buNone/>
+              <a:defRPr sz="1800" b="1" kern="1200" spc="150" baseline="0">
+                <a:solidFill>
+                  <a:schemeClr val="tx1">
+                    <a:lumMod val="75000"/>
+                    <a:lumOff val="25000"/>
+                  </a:schemeClr>
+                </a:solidFill>
+                <a:latin typeface="+mn-lt"/>
+                <a:ea typeface="+mn-ea"/>
+                <a:cs typeface="+mn-cs"/>
+              </a:defRPr>
+            </a:lvl1pPr>
+            <a:lvl2pPr marL="0" indent="0" algn="l" defTabSz="914400" rtl="0" eaLnBrk="1" latinLnBrk="0" hangingPunct="1">
+              <a:lnSpc>
+                <a:spcPct val="140000"/>
+              </a:lnSpc>
+              <a:spcBef>
+                <a:spcPts val="930"/>
+              </a:spcBef>
+              <a:buFont typeface="Corbel" panose="020B0503020204020204" pitchFamily="34" charset="0"/>
+              <a:buNone/>
+              <a:defRPr sz="1600" kern="1200" spc="150" baseline="0">
+                <a:solidFill>
+                  <a:schemeClr val="tx1">
+                    <a:lumMod val="75000"/>
+                    <a:lumOff val="25000"/>
+                  </a:schemeClr>
+                </a:solidFill>
+                <a:latin typeface="+mn-lt"/>
+                <a:ea typeface="+mn-ea"/>
+                <a:cs typeface="+mn-cs"/>
+              </a:defRPr>
+            </a:lvl2pPr>
+            <a:lvl3pPr marL="0" indent="-320040" algn="l" defTabSz="914400" rtl="0" eaLnBrk="1" latinLnBrk="0" hangingPunct="1">
+              <a:lnSpc>
+                <a:spcPct val="140000"/>
+              </a:lnSpc>
+              <a:spcBef>
+                <a:spcPts val="930"/>
+              </a:spcBef>
+              <a:buFont typeface="Corbel" panose="020B0503020204020204" pitchFamily="34" charset="0"/>
+              <a:buChar char="–"/>
+              <a:defRPr sz="1400" i="1" kern="1200" spc="150" baseline="0">
+                <a:solidFill>
+                  <a:schemeClr val="tx1">
+                    <a:lumMod val="75000"/>
+                    <a:lumOff val="25000"/>
+                  </a:schemeClr>
+                </a:solidFill>
+                <a:latin typeface="+mn-lt"/>
+                <a:ea typeface="+mn-ea"/>
+                <a:cs typeface="+mn-cs"/>
+              </a:defRPr>
+            </a:lvl3pPr>
+            <a:lvl4pPr marL="0" indent="-320040" algn="l" defTabSz="914400" rtl="0" eaLnBrk="1" latinLnBrk="0" hangingPunct="1">
+              <a:lnSpc>
+                <a:spcPct val="140000"/>
+              </a:lnSpc>
+              <a:spcBef>
+                <a:spcPts val="930"/>
+              </a:spcBef>
+              <a:buFont typeface="Corbel" panose="020B0503020204020204" pitchFamily="34" charset="0"/>
+              <a:buChar char="–"/>
+              <a:defRPr sz="1400" kern="1200" spc="150" baseline="0">
+                <a:solidFill>
+                  <a:schemeClr val="tx1">
+                    <a:lumMod val="75000"/>
+                    <a:lumOff val="25000"/>
+                  </a:schemeClr>
+                </a:solidFill>
+                <a:latin typeface="+mn-lt"/>
+                <a:ea typeface="+mn-ea"/>
+                <a:cs typeface="+mn-cs"/>
+              </a:defRPr>
+            </a:lvl4pPr>
+            <a:lvl5pPr marL="0" indent="-320040" algn="l" defTabSz="914400" rtl="0" eaLnBrk="1" latinLnBrk="0" hangingPunct="1">
+              <a:lnSpc>
+                <a:spcPct val="140000"/>
+              </a:lnSpc>
+              <a:spcBef>
+                <a:spcPts val="930"/>
+              </a:spcBef>
+              <a:buFont typeface="Corbel" panose="020B0503020204020204" pitchFamily="34" charset="0"/>
+              <a:buChar char="–"/>
+              <a:defRPr sz="1400" i="1" kern="1200" spc="150" baseline="0">
+                <a:solidFill>
+                  <a:schemeClr val="tx1">
+                    <a:lumMod val="75000"/>
+                    <a:lumOff val="25000"/>
+                  </a:schemeClr>
+                </a:solidFill>
+                <a:latin typeface="+mn-lt"/>
+                <a:ea typeface="+mn-ea"/>
+                <a:cs typeface="+mn-cs"/>
+              </a:defRPr>
+            </a:lvl5pPr>
+            <a:lvl6pPr marL="1920240" indent="-320040" algn="l" defTabSz="914400" rtl="0" eaLnBrk="1" latinLnBrk="0" hangingPunct="1">
+              <a:lnSpc>
+                <a:spcPct val="111000"/>
+              </a:lnSpc>
+              <a:spcBef>
+                <a:spcPts val="930"/>
+              </a:spcBef>
+              <a:buFont typeface="Corbel" panose="020B0503020204020204" pitchFamily="34" charset="0"/>
+              <a:buChar char="–"/>
+              <a:defRPr sz="1400" kern="1200">
+                <a:solidFill>
+                  <a:schemeClr val="accent1">
+                    <a:lumMod val="75000"/>
+                  </a:schemeClr>
+                </a:solidFill>
+                <a:latin typeface="+mn-lt"/>
+                <a:ea typeface="+mn-ea"/>
+                <a:cs typeface="+mn-cs"/>
+              </a:defRPr>
+            </a:lvl6pPr>
+            <a:lvl7pPr marL="2240280" indent="-320040" algn="l" defTabSz="914400" rtl="0" eaLnBrk="1" latinLnBrk="0" hangingPunct="1">
+              <a:lnSpc>
+                <a:spcPct val="111000"/>
+              </a:lnSpc>
+              <a:spcBef>
+                <a:spcPts val="930"/>
+              </a:spcBef>
+              <a:buFont typeface="Corbel" panose="020B0503020204020204" pitchFamily="34" charset="0"/>
+              <a:buChar char="–"/>
+              <a:defRPr sz="1400" i="1" kern="1200">
+                <a:solidFill>
+                  <a:schemeClr val="accent1">
+                    <a:lumMod val="75000"/>
+                  </a:schemeClr>
+                </a:solidFill>
+                <a:latin typeface="+mn-lt"/>
+                <a:ea typeface="+mn-ea"/>
+                <a:cs typeface="+mn-cs"/>
+              </a:defRPr>
+            </a:lvl7pPr>
+            <a:lvl8pPr marL="2560320" indent="-320040" algn="l" defTabSz="914400" rtl="0" eaLnBrk="1" latinLnBrk="0" hangingPunct="1">
+              <a:lnSpc>
+                <a:spcPct val="111000"/>
+              </a:lnSpc>
+              <a:spcBef>
+                <a:spcPts val="930"/>
+              </a:spcBef>
+              <a:buFont typeface="Corbel" panose="020B0503020204020204" pitchFamily="34" charset="0"/>
+              <a:buChar char="–"/>
+              <a:defRPr sz="1400" kern="1200">
+                <a:solidFill>
+                  <a:schemeClr val="accent1">
+                    <a:lumMod val="75000"/>
+                  </a:schemeClr>
+                </a:solidFill>
+                <a:latin typeface="+mn-lt"/>
+                <a:ea typeface="+mn-ea"/>
+                <a:cs typeface="+mn-cs"/>
+              </a:defRPr>
+            </a:lvl8pPr>
+            <a:lvl9pPr marL="2880360" indent="-320040" algn="l" defTabSz="914400" rtl="0" eaLnBrk="1" latinLnBrk="0" hangingPunct="1">
+              <a:lnSpc>
+                <a:spcPct val="111000"/>
+              </a:lnSpc>
+              <a:spcBef>
+                <a:spcPts val="930"/>
+              </a:spcBef>
+              <a:buFont typeface="Corbel" panose="020B0503020204020204" pitchFamily="34" charset="0"/>
+              <a:buChar char="–"/>
+              <a:defRPr sz="1400" i="1" kern="1200">
+                <a:solidFill>
+                  <a:schemeClr val="accent1">
+                    <a:lumMod val="75000"/>
+                  </a:schemeClr>
+                </a:solidFill>
+                <a:latin typeface="+mn-lt"/>
+                <a:ea typeface="+mn-ea"/>
+                <a:cs typeface="+mn-cs"/>
+              </a:defRPr>
+            </a:lvl9pPr>
+          </a:lstStyle>
+          <a:p>
+            <a:pPr algn="just">
+              <a:lnSpc>
+                <a:spcPct val="100000"/>
+              </a:lnSpc>
+            </a:pPr>
+            <a:r>
+              <a:rPr lang="pt-BR" sz="800" dirty="0" err="1">
+                <a:solidFill>
+                  <a:srgbClr val="97A7B8"/>
+                </a:solidFill>
+              </a:rPr>
+              <a:t>lat</a:t>
+            </a:r>
+            <a:r>
+              <a:rPr lang="pt-BR" sz="800" b="0" dirty="0">
+                <a:solidFill>
+                  <a:srgbClr val="97A7B8"/>
+                </a:solidFill>
+              </a:rPr>
+              <a:t>          0.041753</a:t>
+            </a:r>
+          </a:p>
+          <a:p>
+            <a:pPr algn="just">
+              <a:lnSpc>
+                <a:spcPct val="100000"/>
+              </a:lnSpc>
+            </a:pPr>
+            <a:r>
+              <a:rPr lang="pt-BR" sz="800" dirty="0" err="1">
+                <a:solidFill>
+                  <a:srgbClr val="97A7B8"/>
+                </a:solidFill>
+              </a:rPr>
+              <a:t>lon</a:t>
+            </a:r>
+            <a:r>
+              <a:rPr lang="pt-BR" sz="800" b="0" dirty="0">
+                <a:solidFill>
+                  <a:srgbClr val="97A7B8"/>
+                </a:solidFill>
+              </a:rPr>
+              <a:t>         -0.000362</a:t>
+            </a:r>
+          </a:p>
+          <a:p>
+            <a:pPr algn="just">
+              <a:lnSpc>
+                <a:spcPct val="100000"/>
+              </a:lnSpc>
+            </a:pPr>
+            <a:r>
+              <a:rPr lang="pt-BR" sz="800" dirty="0" err="1">
+                <a:solidFill>
+                  <a:srgbClr val="97A7B8"/>
+                </a:solidFill>
+              </a:rPr>
+              <a:t>price_usd</a:t>
+            </a:r>
+            <a:r>
+              <a:rPr lang="pt-BR" sz="800" dirty="0">
+                <a:solidFill>
+                  <a:srgbClr val="97A7B8"/>
+                </a:solidFill>
+              </a:rPr>
+              <a:t>    </a:t>
+            </a:r>
+            <a:r>
+              <a:rPr lang="pt-BR" sz="800" b="0" dirty="0">
+                <a:solidFill>
+                  <a:srgbClr val="97A7B8"/>
+                </a:solidFill>
+              </a:rPr>
+              <a:t>0.55012</a:t>
+            </a:r>
+          </a:p>
+          <a:p>
+            <a:pPr algn="just">
+              <a:lnSpc>
+                <a:spcPct val="100000"/>
+              </a:lnSpc>
+            </a:pPr>
+            <a:r>
+              <a:rPr lang="pt-BR" sz="800" dirty="0"/>
+              <a:t>MSE</a:t>
+            </a:r>
+            <a:r>
+              <a:rPr lang="pt-BR" sz="800" b="0" dirty="0"/>
+              <a:t>: 840559.9485370703</a:t>
+            </a:r>
+          </a:p>
+          <a:p>
+            <a:pPr algn="just">
+              <a:lnSpc>
+                <a:spcPct val="100000"/>
+              </a:lnSpc>
+            </a:pPr>
+            <a:r>
+              <a:rPr lang="pt-BR" sz="800" dirty="0"/>
+              <a:t>RMSE</a:t>
+            </a:r>
+            <a:r>
+              <a:rPr lang="pt-BR" sz="800" b="0" dirty="0"/>
+              <a:t>: 916.8205650709796</a:t>
+            </a:r>
+          </a:p>
+          <a:p>
+            <a:pPr algn="just">
+              <a:lnSpc>
+                <a:spcPct val="100000"/>
+              </a:lnSpc>
+            </a:pPr>
+            <a:r>
+              <a:rPr lang="pt-BR" sz="800" dirty="0"/>
+              <a:t>MAE</a:t>
+            </a:r>
+            <a:r>
+              <a:rPr lang="pt-BR" sz="800" b="0" dirty="0"/>
+              <a:t>: 704.5320888159223</a:t>
+            </a:r>
+          </a:p>
+          <a:p>
+            <a:pPr algn="just">
+              <a:lnSpc>
+                <a:spcPct val="100000"/>
+              </a:lnSpc>
+            </a:pPr>
+            <a:r>
+              <a:rPr lang="pt-BR" sz="800" dirty="0"/>
+              <a:t>R2</a:t>
+            </a:r>
+            <a:r>
+              <a:rPr lang="pt-BR" sz="800" b="0" dirty="0"/>
+              <a:t>: 0.1957792893493866</a:t>
+            </a:r>
+          </a:p>
+          <a:p>
+            <a:pPr algn="just">
+              <a:lnSpc>
+                <a:spcPct val="100000"/>
+              </a:lnSpc>
+            </a:pPr>
+            <a:r>
+              <a:rPr lang="pt-BR" sz="800" b="0" u="sng" dirty="0"/>
+              <a:t>---------------------------------------------------------------------------</a:t>
+            </a:r>
+            <a:endParaRPr lang="pt-BR" sz="800" b="0" dirty="0"/>
+          </a:p>
+          <a:p>
+            <a:pPr algn="just">
+              <a:lnSpc>
+                <a:spcPct val="100000"/>
+              </a:lnSpc>
+            </a:pPr>
+            <a:r>
+              <a:rPr lang="pt-BR" sz="800" dirty="0" err="1">
+                <a:solidFill>
+                  <a:srgbClr val="97A7B8"/>
+                </a:solidFill>
+              </a:rPr>
+              <a:t>lat</a:t>
+            </a:r>
+            <a:r>
+              <a:rPr lang="pt-BR" sz="800" b="0" dirty="0">
+                <a:solidFill>
+                  <a:srgbClr val="97A7B8"/>
+                </a:solidFill>
+              </a:rPr>
+              <a:t>    0.165391</a:t>
+            </a:r>
+          </a:p>
+          <a:p>
+            <a:pPr algn="just">
+              <a:lnSpc>
+                <a:spcPct val="100000"/>
+              </a:lnSpc>
+            </a:pPr>
+            <a:r>
+              <a:rPr lang="pt-BR" sz="800" dirty="0" err="1">
+                <a:solidFill>
+                  <a:srgbClr val="97A7B8"/>
+                </a:solidFill>
+              </a:rPr>
+              <a:t>lon</a:t>
+            </a:r>
+            <a:r>
+              <a:rPr lang="pt-BR" sz="800" b="0" dirty="0">
+                <a:solidFill>
+                  <a:srgbClr val="97A7B8"/>
+                </a:solidFill>
+              </a:rPr>
+              <a:t>    0.066719</a:t>
+            </a:r>
+          </a:p>
+          <a:p>
+            <a:pPr algn="just">
+              <a:lnSpc>
+                <a:spcPct val="100000"/>
+              </a:lnSpc>
+            </a:pPr>
+            <a:r>
+              <a:rPr lang="pt-BR" sz="800" dirty="0"/>
+              <a:t>MSE</a:t>
+            </a:r>
+            <a:r>
+              <a:rPr lang="pt-BR" sz="800" b="0" dirty="0"/>
+              <a:t>: 1107402.7073803702</a:t>
+            </a:r>
+          </a:p>
+          <a:p>
+            <a:pPr algn="just">
+              <a:lnSpc>
+                <a:spcPct val="100000"/>
+              </a:lnSpc>
+            </a:pPr>
+            <a:r>
+              <a:rPr lang="pt-BR" sz="800" dirty="0"/>
+              <a:t>RMSE</a:t>
+            </a:r>
+            <a:r>
+              <a:rPr lang="pt-BR" sz="800" b="0" dirty="0"/>
+              <a:t>: 1052.332032858627</a:t>
+            </a:r>
+          </a:p>
+          <a:p>
+            <a:pPr algn="just">
+              <a:lnSpc>
+                <a:spcPct val="100000"/>
+              </a:lnSpc>
+            </a:pPr>
+            <a:r>
+              <a:rPr lang="pt-BR" sz="800" dirty="0"/>
+              <a:t>MAE</a:t>
+            </a:r>
+            <a:r>
+              <a:rPr lang="pt-BR" sz="800" b="0" dirty="0"/>
+              <a:t>: 795.543405399754</a:t>
+            </a:r>
+          </a:p>
+          <a:p>
+            <a:pPr algn="just">
+              <a:lnSpc>
+                <a:spcPct val="100000"/>
+              </a:lnSpc>
+            </a:pPr>
+            <a:r>
+              <a:rPr lang="pt-BR" sz="800" dirty="0"/>
+              <a:t>R2</a:t>
+            </a:r>
+            <a:r>
+              <a:rPr lang="pt-BR" sz="800" b="0" dirty="0"/>
+              <a:t>: -0.05952727566411942</a:t>
+            </a:r>
+          </a:p>
+          <a:p>
+            <a:pPr algn="just">
+              <a:lnSpc>
+                <a:spcPct val="100000"/>
+              </a:lnSpc>
+            </a:pPr>
+            <a:endParaRPr lang="pt-BR" sz="800" b="0" dirty="0"/>
+          </a:p>
+          <a:p>
+            <a:pPr algn="just">
+              <a:lnSpc>
+                <a:spcPct val="100000"/>
+              </a:lnSpc>
+            </a:pPr>
+            <a:endParaRPr lang="pt-BR" sz="800" b="0" dirty="0"/>
+          </a:p>
+          <a:p>
+            <a:pPr algn="just">
+              <a:lnSpc>
+                <a:spcPct val="100000"/>
+              </a:lnSpc>
+            </a:pPr>
+            <a:endParaRPr lang="pt-BR" sz="800" b="0" dirty="0"/>
+          </a:p>
+          <a:p>
+            <a:pPr algn="just">
+              <a:lnSpc>
+                <a:spcPct val="100000"/>
+              </a:lnSpc>
+            </a:pPr>
+            <a:r>
+              <a:rPr lang="pt-BR" sz="800" dirty="0" err="1">
+                <a:solidFill>
+                  <a:srgbClr val="97A7B8"/>
+                </a:solidFill>
+              </a:rPr>
+              <a:t>lat</a:t>
+            </a:r>
+            <a:r>
+              <a:rPr lang="pt-BR" sz="800" b="0" dirty="0">
+                <a:solidFill>
+                  <a:srgbClr val="97A7B8"/>
+                </a:solidFill>
+              </a:rPr>
+              <a:t>                          0.157016</a:t>
+            </a:r>
+          </a:p>
+          <a:p>
+            <a:pPr algn="just">
+              <a:lnSpc>
+                <a:spcPct val="100000"/>
+              </a:lnSpc>
+            </a:pPr>
+            <a:r>
+              <a:rPr lang="pt-BR" sz="800" dirty="0" err="1">
+                <a:solidFill>
+                  <a:srgbClr val="97A7B8"/>
+                </a:solidFill>
+              </a:rPr>
+              <a:t>lon</a:t>
+            </a:r>
+            <a:r>
+              <a:rPr lang="pt-BR" sz="800" b="0" dirty="0">
+                <a:solidFill>
+                  <a:srgbClr val="97A7B8"/>
+                </a:solidFill>
+              </a:rPr>
+              <a:t>                          0.054213</a:t>
+            </a:r>
+          </a:p>
+          <a:p>
+            <a:pPr algn="just">
+              <a:lnSpc>
+                <a:spcPct val="100000"/>
+              </a:lnSpc>
+            </a:pPr>
+            <a:r>
+              <a:rPr lang="pt-BR" sz="800" dirty="0">
+                <a:solidFill>
+                  <a:srgbClr val="97A7B8"/>
+                </a:solidFill>
+              </a:rPr>
+              <a:t>surface</a:t>
+            </a:r>
+            <a:r>
+              <a:rPr lang="pt-BR" sz="800" b="0" dirty="0">
+                <a:solidFill>
+                  <a:srgbClr val="97A7B8"/>
+                </a:solidFill>
+              </a:rPr>
+              <a:t>_total_in_m2_Final    0.001688</a:t>
+            </a:r>
+          </a:p>
+          <a:p>
+            <a:pPr algn="just">
+              <a:lnSpc>
+                <a:spcPct val="100000"/>
+              </a:lnSpc>
+            </a:pPr>
+            <a:r>
+              <a:rPr lang="pt-BR" sz="800" dirty="0"/>
+              <a:t>MSE</a:t>
+            </a:r>
+            <a:r>
+              <a:rPr lang="pt-BR" sz="800" b="0" dirty="0"/>
+              <a:t>: 1103204.4859065097</a:t>
+            </a:r>
+          </a:p>
+          <a:p>
+            <a:pPr algn="just">
+              <a:lnSpc>
+                <a:spcPct val="100000"/>
+              </a:lnSpc>
+            </a:pPr>
+            <a:r>
+              <a:rPr lang="pt-BR" sz="800" dirty="0"/>
+              <a:t>RMSE</a:t>
+            </a:r>
+            <a:r>
+              <a:rPr lang="pt-BR" sz="800" b="0" dirty="0"/>
+              <a:t>: 1050.335415906038</a:t>
+            </a:r>
+          </a:p>
+          <a:p>
+            <a:pPr algn="just">
+              <a:lnSpc>
+                <a:spcPct val="100000"/>
+              </a:lnSpc>
+            </a:pPr>
+            <a:r>
+              <a:rPr lang="pt-BR" sz="800" dirty="0"/>
+              <a:t>MAE</a:t>
+            </a:r>
+            <a:r>
+              <a:rPr lang="pt-BR" sz="800" b="0" dirty="0"/>
+              <a:t>: 793.6079027307653</a:t>
+            </a:r>
+          </a:p>
+          <a:p>
+            <a:pPr algn="just">
+              <a:lnSpc>
+                <a:spcPct val="100000"/>
+              </a:lnSpc>
+            </a:pPr>
+            <a:r>
+              <a:rPr lang="pt-BR" sz="800" dirty="0"/>
+              <a:t>R2</a:t>
+            </a:r>
+            <a:r>
+              <a:rPr lang="pt-BR" sz="800" b="0" dirty="0"/>
+              <a:t>: -0.05551055245115544</a:t>
+            </a:r>
+          </a:p>
+          <a:p>
+            <a:pPr algn="just">
+              <a:lnSpc>
+                <a:spcPct val="100000"/>
+              </a:lnSpc>
+            </a:pPr>
+            <a:r>
+              <a:rPr lang="pt-BR" sz="800" b="0" u="sng" dirty="0">
+                <a:solidFill>
+                  <a:srgbClr val="595460"/>
+                </a:solidFill>
+              </a:rPr>
+              <a:t>---------------------------------------------------------------------------</a:t>
+            </a:r>
+          </a:p>
+          <a:p>
+            <a:pPr algn="just">
+              <a:lnSpc>
+                <a:spcPct val="100000"/>
+              </a:lnSpc>
+            </a:pPr>
+            <a:r>
+              <a:rPr lang="pt-BR" sz="800" dirty="0" err="1">
+                <a:solidFill>
+                  <a:srgbClr val="97A7B8"/>
+                </a:solidFill>
+              </a:rPr>
+              <a:t>lat</a:t>
+            </a:r>
+            <a:r>
+              <a:rPr lang="pt-BR" sz="800" b="0" dirty="0">
+                <a:solidFill>
+                  <a:srgbClr val="97A7B8"/>
+                </a:solidFill>
+              </a:rPr>
+              <a:t>                          0.027833</a:t>
+            </a:r>
+          </a:p>
+          <a:p>
+            <a:pPr algn="just">
+              <a:lnSpc>
+                <a:spcPct val="100000"/>
+              </a:lnSpc>
+            </a:pPr>
+            <a:r>
+              <a:rPr lang="pt-BR" sz="800" dirty="0" err="1">
+                <a:solidFill>
+                  <a:srgbClr val="97A7B8"/>
+                </a:solidFill>
+              </a:rPr>
+              <a:t>lon</a:t>
+            </a:r>
+            <a:r>
+              <a:rPr lang="pt-BR" sz="800" b="0" dirty="0">
+                <a:solidFill>
+                  <a:srgbClr val="97A7B8"/>
+                </a:solidFill>
+              </a:rPr>
+              <a:t>                          0.043473</a:t>
+            </a:r>
+          </a:p>
+          <a:p>
+            <a:pPr algn="just">
+              <a:lnSpc>
+                <a:spcPct val="100000"/>
+              </a:lnSpc>
+            </a:pPr>
+            <a:r>
+              <a:rPr lang="pt-BR" sz="800" dirty="0">
+                <a:solidFill>
+                  <a:srgbClr val="97A7B8"/>
+                </a:solidFill>
+              </a:rPr>
+              <a:t>surface_total_in_m2_Final    </a:t>
+            </a:r>
+            <a:r>
+              <a:rPr lang="pt-BR" sz="800" b="0" dirty="0">
+                <a:solidFill>
+                  <a:srgbClr val="97A7B8"/>
+                </a:solidFill>
+              </a:rPr>
+              <a:t>4.725013</a:t>
+            </a:r>
+          </a:p>
+          <a:p>
+            <a:pPr algn="just">
+              <a:lnSpc>
+                <a:spcPct val="100000"/>
+              </a:lnSpc>
+            </a:pPr>
+            <a:r>
+              <a:rPr lang="pt-BR" sz="800" dirty="0" err="1">
+                <a:solidFill>
+                  <a:srgbClr val="97A7B8"/>
+                </a:solidFill>
+              </a:rPr>
+              <a:t>price_usd</a:t>
+            </a:r>
+            <a:r>
+              <a:rPr lang="pt-BR" sz="800" dirty="0">
+                <a:solidFill>
+                  <a:srgbClr val="97A7B8"/>
+                </a:solidFill>
+              </a:rPr>
+              <a:t>                    </a:t>
+            </a:r>
+            <a:r>
+              <a:rPr lang="pt-BR" sz="800" b="0" dirty="0">
+                <a:solidFill>
+                  <a:srgbClr val="97A7B8"/>
+                </a:solidFill>
+              </a:rPr>
+              <a:t>6.278011</a:t>
+            </a:r>
+          </a:p>
+          <a:p>
+            <a:pPr algn="just">
+              <a:lnSpc>
+                <a:spcPct val="100000"/>
+              </a:lnSpc>
+            </a:pPr>
+            <a:r>
+              <a:rPr lang="pt-BR" sz="800" dirty="0"/>
+              <a:t>MSE</a:t>
+            </a:r>
+            <a:r>
+              <a:rPr lang="pt-BR" sz="800" b="0" dirty="0"/>
+              <a:t>: 567365.0222819957</a:t>
+            </a:r>
+          </a:p>
+          <a:p>
+            <a:pPr algn="just">
+              <a:lnSpc>
+                <a:spcPct val="100000"/>
+              </a:lnSpc>
+            </a:pPr>
+            <a:r>
+              <a:rPr lang="pt-BR" sz="800" dirty="0"/>
+              <a:t>RMSE</a:t>
+            </a:r>
+            <a:r>
+              <a:rPr lang="pt-BR" sz="800" b="0" dirty="0"/>
+              <a:t>: 753.2363654803157</a:t>
+            </a:r>
+          </a:p>
+          <a:p>
+            <a:pPr algn="just">
+              <a:lnSpc>
+                <a:spcPct val="100000"/>
+              </a:lnSpc>
+            </a:pPr>
+            <a:r>
+              <a:rPr lang="pt-BR" sz="800" dirty="0"/>
+              <a:t>MAE</a:t>
+            </a:r>
+            <a:r>
+              <a:rPr lang="pt-BR" sz="800" b="0" dirty="0"/>
+              <a:t>: 470.91370197155516</a:t>
+            </a:r>
+          </a:p>
+          <a:p>
+            <a:pPr algn="just">
+              <a:lnSpc>
+                <a:spcPct val="100000"/>
+              </a:lnSpc>
+            </a:pPr>
+            <a:r>
+              <a:rPr lang="pt-BR" sz="800" dirty="0"/>
+              <a:t>R2</a:t>
+            </a:r>
+            <a:r>
+              <a:rPr lang="pt-BR" sz="800" b="0" dirty="0"/>
+              <a:t>: 0.4571634037381159</a:t>
+            </a:r>
+          </a:p>
+        </p:txBody>
+      </p:sp>
+      <p:sp>
+        <p:nvSpPr>
+          <p:cNvPr id="3" name="CaixaDeTexto 2">
+            <a:extLst>
+              <a:ext uri="{FF2B5EF4-FFF2-40B4-BE49-F238E27FC236}">
+                <a16:creationId xmlns:a16="http://schemas.microsoft.com/office/drawing/2014/main" id="{37923DE2-E031-B4C2-CECE-D3C2EF51B9A9}"/>
+              </a:ext>
+            </a:extLst>
+          </p:cNvPr>
+          <p:cNvSpPr txBox="1"/>
+          <p:nvPr/>
+        </p:nvSpPr>
+        <p:spPr>
+          <a:xfrm>
+            <a:off x="1367406" y="2432807"/>
+            <a:ext cx="10075178" cy="276999"/>
+          </a:xfrm>
+          <a:prstGeom prst="rect">
+            <a:avLst/>
+          </a:prstGeom>
+          <a:noFill/>
+        </p:spPr>
+        <p:txBody>
+          <a:bodyPr wrap="square" rtlCol="0">
+            <a:spAutoFit/>
+          </a:bodyPr>
+          <a:lstStyle/>
+          <a:p>
+            <a:pPr marL="285750" indent="-285750">
+              <a:buFont typeface="Arial" panose="020B0604020202020204" pitchFamily="34" charset="0"/>
+              <a:buChar char="•"/>
+            </a:pPr>
+            <a:r>
+              <a:rPr lang="pt-BR" sz="1200" dirty="0"/>
+              <a:t>Analisando os modelos e levando em consideração o impacto das </a:t>
+            </a:r>
+            <a:r>
+              <a:rPr lang="pt-BR" sz="1200" dirty="0" err="1"/>
+              <a:t>features</a:t>
+            </a:r>
+            <a:r>
+              <a:rPr lang="pt-BR" sz="1200" dirty="0"/>
+              <a:t> sobre os modelos.</a:t>
+            </a:r>
+            <a:endParaRPr lang="en-US" sz="1200" dirty="0"/>
+          </a:p>
+        </p:txBody>
+      </p:sp>
+    </p:spTree>
+    <p:extLst>
+      <p:ext uri="{BB962C8B-B14F-4D97-AF65-F5344CB8AC3E}">
+        <p14:creationId xmlns:p14="http://schemas.microsoft.com/office/powerpoint/2010/main" val="2309755227"/>
+      </p:ext>
+    </p:extLst>
+  </p:cSld>
+  <p:clrMapOvr>
+    <a:masterClrMapping/>
+  </p:clrMapOvr>
+</p:sld>
+</file>
+
+<file path=ppt/slides/slide11.xml><?xml version="1.0" encoding="utf-8"?>
+<p:sld xmlns:a="http://schemas.openxmlformats.org/drawingml/2006/main" xmlns:r="http://schemas.openxmlformats.org/officeDocument/2006/relationships" xmlns:p="http://schemas.openxmlformats.org/presentationml/2006/main">
+  <p:cSld>
+    <p:spTree>
+      <p:nvGrpSpPr>
+        <p:cNvPr id="1" name=""/>
+        <p:cNvGrpSpPr/>
+        <p:nvPr/>
+      </p:nvGrpSpPr>
+      <p:grpSpPr>
+        <a:xfrm>
+          <a:off x="0" y="0"/>
+          <a:ext cx="0" cy="0"/>
+          <a:chOff x="0" y="0"/>
+          <a:chExt cx="0" cy="0"/>
+        </a:xfrm>
+      </p:grpSpPr>
+      <p:sp>
+        <p:nvSpPr>
+          <p:cNvPr id="6" name="Título 5">
+            <a:extLst>
+              <a:ext uri="{FF2B5EF4-FFF2-40B4-BE49-F238E27FC236}">
+                <a16:creationId xmlns:a16="http://schemas.microsoft.com/office/drawing/2014/main" id="{AFE67981-079D-4463-B997-67E6CA039B58}"/>
+              </a:ext>
+            </a:extLst>
+          </p:cNvPr>
+          <p:cNvSpPr>
+            <a:spLocks noGrp="1"/>
+          </p:cNvSpPr>
+          <p:nvPr>
+            <p:ph type="title"/>
+          </p:nvPr>
+        </p:nvSpPr>
+        <p:spPr>
+          <a:xfrm>
+            <a:off x="1535371" y="1044054"/>
+            <a:ext cx="10013709" cy="1030360"/>
+          </a:xfrm>
+        </p:spPr>
+        <p:txBody>
+          <a:bodyPr rtlCol="0">
+            <a:normAutofit/>
+          </a:bodyPr>
+          <a:lstStyle/>
+          <a:p>
+            <a:pPr rtl="0"/>
+            <a:r>
+              <a:rPr lang="pt-BR" dirty="0"/>
+              <a:t>Modelo de Regressão Linear – Múltipla </a:t>
+            </a:r>
+          </a:p>
+        </p:txBody>
+      </p:sp>
+      <p:sp>
+        <p:nvSpPr>
+          <p:cNvPr id="5" name="Espaço Reservado para o Número do Slide 4">
+            <a:extLst>
+              <a:ext uri="{FF2B5EF4-FFF2-40B4-BE49-F238E27FC236}">
+                <a16:creationId xmlns:a16="http://schemas.microsoft.com/office/drawing/2014/main" id="{EF3BF995-3A96-4426-B458-AE23D8310BF0}"/>
+              </a:ext>
+            </a:extLst>
+          </p:cNvPr>
+          <p:cNvSpPr>
+            <a:spLocks noGrp="1"/>
+          </p:cNvSpPr>
+          <p:nvPr>
+            <p:ph type="sldNum" sz="quarter" idx="12"/>
+          </p:nvPr>
+        </p:nvSpPr>
+        <p:spPr>
+          <a:xfrm>
+            <a:off x="10569202" y="6309360"/>
+            <a:ext cx="979879" cy="457200"/>
+          </a:xfrm>
+        </p:spPr>
+        <p:txBody>
+          <a:bodyPr rtlCol="0"/>
+          <a:lstStyle/>
+          <a:p>
+            <a:pPr rtl="0"/>
+            <a:fld id="{FAEF9944-A4F6-4C59-AEBD-678D6480B8EA}" type="slidenum">
+              <a:rPr lang="pt-BR" smtClean="0"/>
+              <a:pPr rtl="0"/>
+              <a:t>11</a:t>
+            </a:fld>
+            <a:endParaRPr lang="pt-BR" dirty="0"/>
+          </a:p>
+        </p:txBody>
+      </p:sp>
+      <p:sp>
+        <p:nvSpPr>
+          <p:cNvPr id="9" name="Espaço Reservado para Conteúdo 8">
+            <a:extLst>
+              <a:ext uri="{FF2B5EF4-FFF2-40B4-BE49-F238E27FC236}">
+                <a16:creationId xmlns:a16="http://schemas.microsoft.com/office/drawing/2014/main" id="{A63F24D2-300A-3FE5-79EB-B45F34D87443}"/>
+              </a:ext>
+            </a:extLst>
+          </p:cNvPr>
+          <p:cNvSpPr txBox="1">
+            <a:spLocks/>
+          </p:cNvSpPr>
+          <p:nvPr/>
+        </p:nvSpPr>
+        <p:spPr>
+          <a:xfrm>
             <a:off x="1183133" y="2504258"/>
-            <a:ext cx="4912867" cy="3610215"/>
+            <a:ext cx="4912867" cy="3931048"/>
           </a:xfrm>
           <a:prstGeom prst="rect">
             <a:avLst/>
@@ -11548,17 +12501,62 @@
               <a:buChar char="•"/>
             </a:pPr>
             <a:r>
-              <a:rPr lang="pt-BR" sz="1200" b="0" dirty="0"/>
-              <a:t>Para o modelo de regressão linear </a:t>
-            </a:r>
-            <a:r>
-              <a:rPr lang="pt-BR" sz="1200" b="0" dirty="0" err="1"/>
-              <a:t>mútlipla</a:t>
-            </a:r>
-            <a:r>
-              <a:rPr lang="pt-BR" sz="1200" b="0" dirty="0"/>
-              <a:t>, utilizamos as variáveis “Superfície total em m²” (como eixo x) e “Preço em dólar” (como eixo y).</a:t>
-            </a:r>
+              <a:rPr lang="pt-BR" sz="1100" dirty="0"/>
+              <a:t>objetivo final</a:t>
+            </a:r>
+            <a:r>
+              <a:rPr lang="pt-BR" sz="1100" b="0" dirty="0"/>
+              <a:t>: preço do metro quadrado</a:t>
+            </a:r>
+          </a:p>
+          <a:p>
+            <a:pPr marL="285750" indent="-285750">
+              <a:buFont typeface="Arial" panose="020B0604020202020204" pitchFamily="34" charset="0"/>
+              <a:buChar char="•"/>
+            </a:pPr>
+            <a:r>
+              <a:rPr lang="pt-BR" sz="1100" b="0" i="1" dirty="0" err="1"/>
+              <a:t>Permutation</a:t>
+            </a:r>
+            <a:r>
+              <a:rPr lang="pt-BR" sz="1100" b="0" i="1" dirty="0"/>
+              <a:t> </a:t>
+            </a:r>
+            <a:r>
+              <a:rPr lang="pt-BR" sz="1100" b="0" i="1" dirty="0" err="1"/>
+              <a:t>Importance</a:t>
+            </a:r>
+            <a:r>
+              <a:rPr lang="pt-BR" sz="1100" b="0" i="1" dirty="0"/>
+              <a:t>: impacto das </a:t>
+            </a:r>
+            <a:r>
+              <a:rPr lang="pt-BR" sz="1100" b="0" i="1" dirty="0" err="1"/>
+              <a:t>features</a:t>
+            </a:r>
+            <a:r>
+              <a:rPr lang="pt-BR" sz="1100" b="0" i="1" dirty="0"/>
+              <a:t> sobre o modelo</a:t>
+            </a:r>
+          </a:p>
+          <a:p>
+            <a:pPr marL="285750" indent="-285750">
+              <a:buFont typeface="Arial" panose="020B0604020202020204" pitchFamily="34" charset="0"/>
+              <a:buChar char="•"/>
+            </a:pPr>
+            <a:r>
+              <a:rPr lang="pt-BR" sz="1100" b="0" dirty="0"/>
+              <a:t>normalizamos os dados antes de treinar utilizando </a:t>
+            </a:r>
+            <a:r>
+              <a:rPr lang="pt-BR" sz="1100" b="0" i="1" dirty="0"/>
+              <a:t>Standard </a:t>
+            </a:r>
+            <a:r>
+              <a:rPr lang="pt-BR" sz="1100" b="0" i="1" dirty="0" err="1"/>
+              <a:t>Scaler</a:t>
+            </a:r>
+            <a:endParaRPr lang="pt-BR" sz="1100" b="0" dirty="0"/>
           </a:p>
           <a:p>
             <a:r>
@@ -11573,7 +12571,7 @@
             </a:r>
             <a:r>
               <a:rPr lang="pt-BR" sz="1200" b="0" dirty="0"/>
-              <a:t>42076207770.59661</a:t>
+              <a:t>559656.3353232043</a:t>
             </a:r>
           </a:p>
           <a:p>
@@ -11583,7 +12581,7 @@
             </a:r>
             <a:r>
               <a:rPr lang="pt-BR" sz="1200" b="0" dirty="0"/>
-              <a:t>205124.8589776398</a:t>
+              <a:t>748.1018214943767</a:t>
             </a:r>
           </a:p>
           <a:p>
@@ -11593,164 +12591,55 @@
             </a:r>
             <a:r>
               <a:rPr lang="pt-BR" sz="1200" b="0" dirty="0"/>
-              <a:t>105106.98395402894</a:t>
+              <a:t>463.6986715213796</a:t>
             </a:r>
           </a:p>
           <a:p>
             <a:r>
               <a:rPr lang="pt-BR" sz="1200" dirty="0"/>
-              <a:t>R²: </a:t>
+              <a:t>R2: </a:t>
             </a:r>
             <a:r>
               <a:rPr lang="pt-BR" sz="1200" b="0" dirty="0"/>
-              <a:t>0.6970100352891391</a:t>
-            </a:r>
-          </a:p>
-          <a:p>
-            <a:endParaRPr lang="pt-BR" sz="1200" dirty="0"/>
-          </a:p>
-        </p:txBody>
-      </p:sp>
+              <a:t>0.46453882736491625</a:t>
+            </a:r>
+          </a:p>
+        </p:txBody>
+      </p:sp>
+      <p:pic>
+        <p:nvPicPr>
+          <p:cNvPr id="3" name="Imagem 2">
+            <a:extLst>
+              <a:ext uri="{FF2B5EF4-FFF2-40B4-BE49-F238E27FC236}">
+                <a16:creationId xmlns:a16="http://schemas.microsoft.com/office/drawing/2014/main" id="{DECCAE20-0661-9B3E-49A2-EF48009301AA}"/>
+              </a:ext>
+            </a:extLst>
+          </p:cNvPr>
+          <p:cNvPicPr>
+            <a:picLocks noChangeAspect="1"/>
+          </p:cNvPicPr>
+          <p:nvPr/>
+        </p:nvPicPr>
+        <p:blipFill>
+          <a:blip r:embed="rId2"/>
+          <a:stretch>
+            <a:fillRect/>
+          </a:stretch>
+        </p:blipFill>
+        <p:spPr>
+          <a:xfrm>
+            <a:off x="6006518" y="2576472"/>
+            <a:ext cx="6096778" cy="3732887"/>
+          </a:xfrm>
+          <a:prstGeom prst="rect">
+            <a:avLst/>
+          </a:prstGeom>
+        </p:spPr>
+      </p:pic>
     </p:spTree>
     <p:extLst>
       <p:ext uri="{BB962C8B-B14F-4D97-AF65-F5344CB8AC3E}">
-        <p14:creationId xmlns:p14="http://schemas.microsoft.com/office/powerpoint/2010/main" val="2309755227"/>
-      </p:ext>
-    </p:extLst>
-  </p:cSld>
-  <p:clrMapOvr>
-    <a:masterClrMapping/>
-  </p:clrMapOvr>
-</p:sld>
-</file>
-
-<file path=ppt/slides/slide11.xml><?xml version="1.0" encoding="utf-8"?>
-<p:sld xmlns:a="http://schemas.openxmlformats.org/drawingml/2006/main" xmlns:r="http://schemas.openxmlformats.org/officeDocument/2006/relationships" xmlns:p="http://schemas.openxmlformats.org/presentationml/2006/main">
-  <p:cSld>
-    <p:spTree>
-      <p:nvGrpSpPr>
-        <p:cNvPr id="1" name=""/>
-        <p:cNvGrpSpPr/>
-        <p:nvPr/>
-      </p:nvGrpSpPr>
-      <p:grpSpPr>
-        <a:xfrm>
-          <a:off x="0" y="0"/>
-          <a:ext cx="0" cy="0"/>
-          <a:chOff x="0" y="0"/>
-          <a:chExt cx="0" cy="0"/>
-        </a:xfrm>
-      </p:grpSpPr>
-      <p:pic>
-        <p:nvPicPr>
-          <p:cNvPr id="56" name="Espaço Reservado para Imagem 55" descr="Silhueta de um prédio">
-            <a:extLst>
-              <a:ext uri="{FF2B5EF4-FFF2-40B4-BE49-F238E27FC236}">
-                <a16:creationId xmlns:a16="http://schemas.microsoft.com/office/drawing/2014/main" id="{8151A96E-A066-4899-8E11-03CDD28C5500}"/>
-              </a:ext>
-            </a:extLst>
-          </p:cNvPr>
-          <p:cNvPicPr>
-            <a:picLocks noGrp="1" noChangeAspect="1"/>
-          </p:cNvPicPr>
-          <p:nvPr>
-            <p:ph type="pic" sz="quarter" idx="13"/>
-          </p:nvPr>
-        </p:nvPicPr>
-        <p:blipFill rotWithShape="1">
-          <a:blip r:embed="rId3" cstate="screen">
-            <a:extLst>
-              <a:ext uri="{28A0092B-C50C-407E-A947-70E740481C1C}">
-                <a14:useLocalDpi xmlns:a14="http://schemas.microsoft.com/office/drawing/2010/main" val="0"/>
-              </a:ext>
-            </a:extLst>
-          </a:blip>
-          <a:srcRect/>
-          <a:stretch/>
-        </p:blipFill>
-        <p:spPr>
-          <a:xfrm>
-            <a:off x="0" y="0"/>
-            <a:ext cx="12192000" cy="6858000"/>
-          </a:xfrm>
-        </p:spPr>
-      </p:pic>
-      <p:sp>
-        <p:nvSpPr>
-          <p:cNvPr id="41" name="Título 40">
-            <a:extLst>
-              <a:ext uri="{FF2B5EF4-FFF2-40B4-BE49-F238E27FC236}">
-                <a16:creationId xmlns:a16="http://schemas.microsoft.com/office/drawing/2014/main" id="{1B3AD758-B43F-43DC-8A29-B21D2FA57DB1}"/>
-              </a:ext>
-            </a:extLst>
-          </p:cNvPr>
-          <p:cNvSpPr>
-            <a:spLocks noGrp="1"/>
-          </p:cNvSpPr>
-          <p:nvPr>
-            <p:ph type="title"/>
-          </p:nvPr>
-        </p:nvSpPr>
-        <p:spPr>
-          <a:xfrm>
-            <a:off x="-1725" y="1095508"/>
-            <a:ext cx="4606535" cy="3936931"/>
-          </a:xfrm>
-        </p:spPr>
-        <p:txBody>
-          <a:bodyPr rtlCol="0" anchor="ctr">
-            <a:noAutofit/>
-          </a:bodyPr>
-          <a:lstStyle/>
-          <a:p>
-            <a:pPr rtl="0"/>
-            <a:r>
-              <a:rPr lang="pt-BR" dirty="0"/>
-              <a:t>Modelo 3 - Regressão Linear Múltipla</a:t>
-            </a:r>
-          </a:p>
-        </p:txBody>
-      </p:sp>
-      <p:sp>
-        <p:nvSpPr>
-          <p:cNvPr id="24" name="Espaço Reservado para o Número do Slide 23">
-            <a:extLst>
-              <a:ext uri="{FF2B5EF4-FFF2-40B4-BE49-F238E27FC236}">
-                <a16:creationId xmlns:a16="http://schemas.microsoft.com/office/drawing/2014/main" id="{8CCD3357-E9A1-4B6C-ACE7-EBAE9E70BFD0}"/>
-              </a:ext>
-            </a:extLst>
-          </p:cNvPr>
-          <p:cNvSpPr>
-            <a:spLocks noGrp="1"/>
-          </p:cNvSpPr>
-          <p:nvPr>
-            <p:ph type="sldNum" sz="quarter" idx="12"/>
-          </p:nvPr>
-        </p:nvSpPr>
-        <p:spPr>
-          <a:xfrm>
-            <a:off x="10569202" y="6309360"/>
-            <a:ext cx="979879" cy="457200"/>
-          </a:xfrm>
-        </p:spPr>
-        <p:txBody>
-          <a:bodyPr rtlCol="0"/>
-          <a:lstStyle/>
-          <a:p>
-            <a:pPr rtl="0"/>
-            <a:fld id="{FAEF9944-A4F6-4C59-AEBD-678D6480B8EA}" type="slidenum">
-              <a:rPr lang="pt-BR" smtClean="0"/>
-              <a:pPr rtl="0"/>
-              <a:t>11</a:t>
-            </a:fld>
-            <a:endParaRPr lang="pt-BR" dirty="0"/>
-          </a:p>
-        </p:txBody>
-      </p:sp>
-    </p:spTree>
-    <p:extLst>
-      <p:ext uri="{BB962C8B-B14F-4D97-AF65-F5344CB8AC3E}">
-        <p14:creationId xmlns:p14="http://schemas.microsoft.com/office/powerpoint/2010/main" val="2332871761"/>
+        <p14:creationId xmlns:p14="http://schemas.microsoft.com/office/powerpoint/2010/main" val="1713545271"/>
       </p:ext>
     </p:extLst>
   </p:cSld>
@@ -11777,12 +12666,46 @@
           <a:chExt cx="0" cy="0"/>
         </a:xfrm>
       </p:grpSpPr>
-      <p:sp>
-        <p:nvSpPr>
-          <p:cNvPr id="6" name="Título 5">
-            <a:extLst>
-              <a:ext uri="{FF2B5EF4-FFF2-40B4-BE49-F238E27FC236}">
-                <a16:creationId xmlns:a16="http://schemas.microsoft.com/office/drawing/2014/main" id="{AFE67981-079D-4463-B997-67E6CA039B58}"/>
+      <p:pic>
+        <p:nvPicPr>
+          <p:cNvPr id="56" name="Espaço Reservado para Imagem 55" descr="Silhueta de um prédio">
+            <a:extLst>
+              <a:ext uri="{FF2B5EF4-FFF2-40B4-BE49-F238E27FC236}">
+                <a16:creationId xmlns:a16="http://schemas.microsoft.com/office/drawing/2014/main" id="{8151A96E-A066-4899-8E11-03CDD28C5500}"/>
+              </a:ext>
+            </a:extLst>
+          </p:cNvPr>
+          <p:cNvPicPr>
+            <a:picLocks noGrp="1" noChangeAspect="1"/>
+          </p:cNvPicPr>
+          <p:nvPr>
+            <p:ph type="pic" sz="quarter" idx="13"/>
+          </p:nvPr>
+        </p:nvPicPr>
+        <p:blipFill rotWithShape="1">
+          <a:blip r:embed="rId3" cstate="screen">
+            <a:extLst>
+              <a:ext uri="{28A0092B-C50C-407E-A947-70E740481C1C}">
+                <a14:useLocalDpi xmlns:a14="http://schemas.microsoft.com/office/drawing/2010/main" val="0"/>
+              </a:ext>
+            </a:extLst>
+          </a:blip>
+          <a:srcRect/>
+          <a:stretch/>
+        </p:blipFill>
+        <p:spPr>
+          <a:xfrm>
+            <a:off x="0" y="0"/>
+            <a:ext cx="12192000" cy="6858000"/>
+          </a:xfrm>
+        </p:spPr>
+      </p:pic>
+      <p:sp>
+        <p:nvSpPr>
+          <p:cNvPr id="41" name="Título 40">
+            <a:extLst>
+              <a:ext uri="{FF2B5EF4-FFF2-40B4-BE49-F238E27FC236}">
+                <a16:creationId xmlns:a16="http://schemas.microsoft.com/office/drawing/2014/main" id="{1B3AD758-B43F-43DC-8A29-B21D2FA57DB1}"/>
               </a:ext>
             </a:extLst>
           </p:cNvPr>
@@ -11795,30 +12718,30 @@
         </p:nvSpPr>
         <p:spPr>
           <a:xfrm>
-            <a:off x="1535371" y="1044054"/>
-            <a:ext cx="10013709" cy="1030360"/>
-          </a:xfrm>
-        </p:spPr>
-        <p:txBody>
-          <a:bodyPr rtlCol="0">
-            <a:normAutofit fontScale="90000"/>
+            <a:off x="-1725" y="1095508"/>
+            <a:ext cx="4606535" cy="3936931"/>
+          </a:xfrm>
+        </p:spPr>
+        <p:txBody>
+          <a:bodyPr rtlCol="0" anchor="ctr">
+            <a:noAutofit/>
           </a:bodyPr>
           <a:lstStyle/>
           <a:p>
             <a:pPr rtl="0"/>
             <a:r>
               <a:rPr lang="pt-BR" dirty="0"/>
-              <a:t>Modelo de Regressão Linear – Múltipla 1</a:t>
-            </a:r>
-          </a:p>
-        </p:txBody>
-      </p:sp>
-      <p:sp>
-        <p:nvSpPr>
-          <p:cNvPr id="5" name="Espaço Reservado para o Número do Slide 4">
-            <a:extLst>
-              <a:ext uri="{FF2B5EF4-FFF2-40B4-BE49-F238E27FC236}">
-                <a16:creationId xmlns:a16="http://schemas.microsoft.com/office/drawing/2014/main" id="{EF3BF995-3A96-4426-B458-AE23D8310BF0}"/>
+              <a:t>Modelo 3 - Regressão Linear Múltipla</a:t>
+            </a:r>
+          </a:p>
+        </p:txBody>
+      </p:sp>
+      <p:sp>
+        <p:nvSpPr>
+          <p:cNvPr id="24" name="Espaço Reservado para o Número do Slide 23">
+            <a:extLst>
+              <a:ext uri="{FF2B5EF4-FFF2-40B4-BE49-F238E27FC236}">
+                <a16:creationId xmlns:a16="http://schemas.microsoft.com/office/drawing/2014/main" id="{8CCD3357-E9A1-4B6C-ACE7-EBAE9E70BFD0}"/>
               </a:ext>
             </a:extLst>
           </p:cNvPr>
@@ -11849,6 +12772,96 @@
           </a:p>
         </p:txBody>
       </p:sp>
+    </p:spTree>
+    <p:extLst>
+      <p:ext uri="{BB962C8B-B14F-4D97-AF65-F5344CB8AC3E}">
+        <p14:creationId xmlns:p14="http://schemas.microsoft.com/office/powerpoint/2010/main" val="2332871761"/>
+      </p:ext>
+    </p:extLst>
+  </p:cSld>
+  <p:clrMapOvr>
+    <a:masterClrMapping/>
+  </p:clrMapOvr>
+</p:sld>
+</file>
+
+<file path=ppt/slides/slide13.xml><?xml version="1.0" encoding="utf-8"?>
+<p:sld xmlns:a="http://schemas.openxmlformats.org/drawingml/2006/main" xmlns:r="http://schemas.openxmlformats.org/officeDocument/2006/relationships" xmlns:p="http://schemas.openxmlformats.org/presentationml/2006/main">
+  <p:cSld>
+    <p:spTree>
+      <p:nvGrpSpPr>
+        <p:cNvPr id="1" name=""/>
+        <p:cNvGrpSpPr/>
+        <p:nvPr/>
+      </p:nvGrpSpPr>
+      <p:grpSpPr>
+        <a:xfrm>
+          <a:off x="0" y="0"/>
+          <a:ext cx="0" cy="0"/>
+          <a:chOff x="0" y="0"/>
+          <a:chExt cx="0" cy="0"/>
+        </a:xfrm>
+      </p:grpSpPr>
+      <p:sp>
+        <p:nvSpPr>
+          <p:cNvPr id="6" name="Título 5">
+            <a:extLst>
+              <a:ext uri="{FF2B5EF4-FFF2-40B4-BE49-F238E27FC236}">
+                <a16:creationId xmlns:a16="http://schemas.microsoft.com/office/drawing/2014/main" id="{AFE67981-079D-4463-B997-67E6CA039B58}"/>
+              </a:ext>
+            </a:extLst>
+          </p:cNvPr>
+          <p:cNvSpPr>
+            <a:spLocks noGrp="1"/>
+          </p:cNvSpPr>
+          <p:nvPr>
+            <p:ph type="title"/>
+          </p:nvPr>
+        </p:nvSpPr>
+        <p:spPr/>
+        <p:txBody>
+          <a:bodyPr>
+            <a:normAutofit fontScale="90000"/>
+          </a:bodyPr>
+          <a:lstStyle/>
+          <a:p>
+            <a:r>
+              <a:rPr lang="pt-BR" dirty="0"/>
+              <a:t>Modelo de Regressão Linear – Múltipla 1</a:t>
+            </a:r>
+          </a:p>
+        </p:txBody>
+      </p:sp>
+      <p:sp>
+        <p:nvSpPr>
+          <p:cNvPr id="5" name="Espaço Reservado para o Número do Slide 4">
+            <a:extLst>
+              <a:ext uri="{FF2B5EF4-FFF2-40B4-BE49-F238E27FC236}">
+                <a16:creationId xmlns:a16="http://schemas.microsoft.com/office/drawing/2014/main" id="{EF3BF995-3A96-4426-B458-AE23D8310BF0}"/>
+              </a:ext>
+            </a:extLst>
+          </p:cNvPr>
+          <p:cNvSpPr>
+            <a:spLocks noGrp="1"/>
+          </p:cNvSpPr>
+          <p:nvPr>
+            <p:ph type="sldNum" sz="quarter" idx="12"/>
+          </p:nvPr>
+        </p:nvSpPr>
+        <p:spPr/>
+        <p:txBody>
+          <a:bodyPr/>
+          <a:lstStyle/>
+          <a:p>
+            <a:fld id="{FAEF9944-A4F6-4C59-AEBD-678D6480B8EA}" type="slidenum">
+              <a:rPr lang="pt-BR" smtClean="0"/>
+              <a:pPr/>
+              <a:t>13</a:t>
+            </a:fld>
+            <a:endParaRPr lang="pt-BR" dirty="0"/>
+          </a:p>
+        </p:txBody>
+      </p:sp>
       <p:sp>
         <p:nvSpPr>
           <p:cNvPr id="9" name="Espaço Reservado para Conteúdo 8">
@@ -11865,8 +12878,8 @@
         </p:nvSpPr>
         <p:spPr>
           <a:xfrm>
-            <a:off x="1183133" y="2504258"/>
-            <a:ext cx="4912867" cy="3931048"/>
+            <a:off x="1183134" y="2504258"/>
+            <a:ext cx="3816706" cy="1715404"/>
           </a:xfrm>
           <a:prstGeom prst="rect">
             <a:avLst/>
@@ -12062,52 +13075,6 @@
             </a:lvl9pPr>
           </a:lstStyle>
           <a:p>
-            <a:r>
-              <a:rPr lang="pt-BR" sz="1200" dirty="0"/>
-              <a:t>Variáveis: </a:t>
-            </a:r>
-          </a:p>
-          <a:p>
-            <a:r>
-              <a:rPr lang="pt-BR" sz="1200" dirty="0"/>
-              <a:t>MSE: </a:t>
-            </a:r>
-            <a:r>
-              <a:rPr lang="pt-BR" sz="1200" b="0" dirty="0"/>
-              <a:t>559656.3353</a:t>
-            </a:r>
-          </a:p>
-          <a:p>
-            <a:r>
-              <a:rPr lang="pt-BR" sz="1200" dirty="0"/>
-              <a:t>RMSE: </a:t>
-            </a:r>
-            <a:r>
-              <a:rPr lang="pt-BR" sz="1200" b="0" dirty="0"/>
-              <a:t>748.10.18</a:t>
-            </a:r>
-          </a:p>
-          <a:p>
-            <a:r>
-              <a:rPr lang="pt-BR" sz="1200" dirty="0"/>
-              <a:t>MAE: </a:t>
-            </a:r>
-            <a:r>
-              <a:rPr lang="pt-BR" sz="1200" b="0" dirty="0"/>
-              <a:t>463.6986</a:t>
-            </a:r>
-          </a:p>
-          <a:p>
-            <a:r>
-              <a:rPr lang="pt-BR" sz="1200" dirty="0"/>
-              <a:t>R²: </a:t>
-            </a:r>
-            <a:r>
-              <a:rPr lang="pt-BR" sz="1200" b="0" dirty="0"/>
-              <a:t>0.4645</a:t>
-            </a:r>
-          </a:p>
-          <a:p>
             <a:endParaRPr lang="pt-BR" sz="1200" dirty="0"/>
           </a:p>
         </p:txBody>
@@ -12116,446 +13083,6 @@
     <p:extLst>
       <p:ext uri="{BB962C8B-B14F-4D97-AF65-F5344CB8AC3E}">
         <p14:creationId xmlns:p14="http://schemas.microsoft.com/office/powerpoint/2010/main" val="1549295"/>
-      </p:ext>
-    </p:extLst>
-  </p:cSld>
-  <p:clrMapOvr>
-    <a:masterClrMapping/>
-  </p:clrMapOvr>
-</p:sld>
-</file>
-
-<file path=ppt/slides/slide13.xml><?xml version="1.0" encoding="utf-8"?>
-<p:sld xmlns:a="http://schemas.openxmlformats.org/drawingml/2006/main" xmlns:r="http://schemas.openxmlformats.org/officeDocument/2006/relationships" xmlns:p="http://schemas.openxmlformats.org/presentationml/2006/main">
-  <p:cSld>
-    <p:spTree>
-      <p:nvGrpSpPr>
-        <p:cNvPr id="1" name=""/>
-        <p:cNvGrpSpPr/>
-        <p:nvPr/>
-      </p:nvGrpSpPr>
-      <p:grpSpPr>
-        <a:xfrm>
-          <a:off x="0" y="0"/>
-          <a:ext cx="0" cy="0"/>
-          <a:chOff x="0" y="0"/>
-          <a:chExt cx="0" cy="0"/>
-        </a:xfrm>
-      </p:grpSpPr>
-      <p:sp>
-        <p:nvSpPr>
-          <p:cNvPr id="6" name="Título 5">
-            <a:extLst>
-              <a:ext uri="{FF2B5EF4-FFF2-40B4-BE49-F238E27FC236}">
-                <a16:creationId xmlns:a16="http://schemas.microsoft.com/office/drawing/2014/main" id="{AFE67981-079D-4463-B997-67E6CA039B58}"/>
-              </a:ext>
-            </a:extLst>
-          </p:cNvPr>
-          <p:cNvSpPr>
-            <a:spLocks noGrp="1"/>
-          </p:cNvSpPr>
-          <p:nvPr>
-            <p:ph type="title"/>
-          </p:nvPr>
-        </p:nvSpPr>
-        <p:spPr>
-          <a:xfrm>
-            <a:off x="1535371" y="1044054"/>
-            <a:ext cx="10013709" cy="1030360"/>
-          </a:xfrm>
-        </p:spPr>
-        <p:txBody>
-          <a:bodyPr rtlCol="0">
-            <a:normAutofit fontScale="90000"/>
-          </a:bodyPr>
-          <a:lstStyle/>
-          <a:p>
-            <a:pPr rtl="0"/>
-            <a:r>
-              <a:rPr lang="pt-BR" dirty="0"/>
-              <a:t>Modelo de Regressão Linear – Múltipla 1</a:t>
-            </a:r>
-          </a:p>
-        </p:txBody>
-      </p:sp>
-      <p:sp>
-        <p:nvSpPr>
-          <p:cNvPr id="5" name="Espaço Reservado para o Número do Slide 4">
-            <a:extLst>
-              <a:ext uri="{FF2B5EF4-FFF2-40B4-BE49-F238E27FC236}">
-                <a16:creationId xmlns:a16="http://schemas.microsoft.com/office/drawing/2014/main" id="{EF3BF995-3A96-4426-B458-AE23D8310BF0}"/>
-              </a:ext>
-            </a:extLst>
-          </p:cNvPr>
-          <p:cNvSpPr>
-            <a:spLocks noGrp="1"/>
-          </p:cNvSpPr>
-          <p:nvPr>
-            <p:ph type="sldNum" sz="quarter" idx="12"/>
-          </p:nvPr>
-        </p:nvSpPr>
-        <p:spPr>
-          <a:xfrm>
-            <a:off x="10569202" y="6309360"/>
-            <a:ext cx="979879" cy="457200"/>
-          </a:xfrm>
-        </p:spPr>
-        <p:txBody>
-          <a:bodyPr rtlCol="0"/>
-          <a:lstStyle/>
-          <a:p>
-            <a:pPr rtl="0"/>
-            <a:fld id="{FAEF9944-A4F6-4C59-AEBD-678D6480B8EA}" type="slidenum">
-              <a:rPr lang="pt-BR" smtClean="0"/>
-              <a:pPr rtl="0"/>
-              <a:t>13</a:t>
-            </a:fld>
-            <a:endParaRPr lang="pt-BR" dirty="0"/>
-          </a:p>
-        </p:txBody>
-      </p:sp>
-      <p:sp>
-        <p:nvSpPr>
-          <p:cNvPr id="9" name="Espaço Reservado para Conteúdo 8">
-            <a:extLst>
-              <a:ext uri="{FF2B5EF4-FFF2-40B4-BE49-F238E27FC236}">
-                <a16:creationId xmlns:a16="http://schemas.microsoft.com/office/drawing/2014/main" id="{A63F24D2-300A-3FE5-79EB-B45F34D87443}"/>
-              </a:ext>
-            </a:extLst>
-          </p:cNvPr>
-          <p:cNvSpPr txBox="1">
-            <a:spLocks/>
-          </p:cNvSpPr>
-          <p:nvPr/>
-        </p:nvSpPr>
-        <p:spPr>
-          <a:xfrm>
-            <a:off x="1183133" y="2504258"/>
-            <a:ext cx="4912867" cy="3931048"/>
-          </a:xfrm>
-          <a:prstGeom prst="rect">
-            <a:avLst/>
-          </a:prstGeom>
-        </p:spPr>
-        <p:txBody>
-          <a:bodyPr rtlCol="0"/>
-          <a:lstStyle>
-            <a:lvl1pPr marL="0" indent="0" algn="l" defTabSz="914400" rtl="0" eaLnBrk="1" latinLnBrk="0" hangingPunct="1">
-              <a:lnSpc>
-                <a:spcPct val="140000"/>
-              </a:lnSpc>
-              <a:spcBef>
-                <a:spcPts val="930"/>
-              </a:spcBef>
-              <a:buFont typeface="Corbel" panose="020B0503020204020204" pitchFamily="34" charset="0"/>
-              <a:buNone/>
-              <a:defRPr sz="1800" b="1" kern="1200" spc="150" baseline="0">
-                <a:solidFill>
-                  <a:schemeClr val="tx1">
-                    <a:lumMod val="75000"/>
-                    <a:lumOff val="25000"/>
-                  </a:schemeClr>
-                </a:solidFill>
-                <a:latin typeface="+mn-lt"/>
-                <a:ea typeface="+mn-ea"/>
-                <a:cs typeface="+mn-cs"/>
-              </a:defRPr>
-            </a:lvl1pPr>
-            <a:lvl2pPr marL="0" indent="0" algn="l" defTabSz="914400" rtl="0" eaLnBrk="1" latinLnBrk="0" hangingPunct="1">
-              <a:lnSpc>
-                <a:spcPct val="140000"/>
-              </a:lnSpc>
-              <a:spcBef>
-                <a:spcPts val="930"/>
-              </a:spcBef>
-              <a:buFont typeface="Corbel" panose="020B0503020204020204" pitchFamily="34" charset="0"/>
-              <a:buNone/>
-              <a:defRPr sz="1600" kern="1200" spc="150" baseline="0">
-                <a:solidFill>
-                  <a:schemeClr val="tx1">
-                    <a:lumMod val="75000"/>
-                    <a:lumOff val="25000"/>
-                  </a:schemeClr>
-                </a:solidFill>
-                <a:latin typeface="+mn-lt"/>
-                <a:ea typeface="+mn-ea"/>
-                <a:cs typeface="+mn-cs"/>
-              </a:defRPr>
-            </a:lvl2pPr>
-            <a:lvl3pPr marL="0" indent="-320040" algn="l" defTabSz="914400" rtl="0" eaLnBrk="1" latinLnBrk="0" hangingPunct="1">
-              <a:lnSpc>
-                <a:spcPct val="140000"/>
-              </a:lnSpc>
-              <a:spcBef>
-                <a:spcPts val="930"/>
-              </a:spcBef>
-              <a:buFont typeface="Corbel" panose="020B0503020204020204" pitchFamily="34" charset="0"/>
-              <a:buChar char="–"/>
-              <a:defRPr sz="1400" i="1" kern="1200" spc="150" baseline="0">
-                <a:solidFill>
-                  <a:schemeClr val="tx1">
-                    <a:lumMod val="75000"/>
-                    <a:lumOff val="25000"/>
-                  </a:schemeClr>
-                </a:solidFill>
-                <a:latin typeface="+mn-lt"/>
-                <a:ea typeface="+mn-ea"/>
-                <a:cs typeface="+mn-cs"/>
-              </a:defRPr>
-            </a:lvl3pPr>
-            <a:lvl4pPr marL="0" indent="-320040" algn="l" defTabSz="914400" rtl="0" eaLnBrk="1" latinLnBrk="0" hangingPunct="1">
-              <a:lnSpc>
-                <a:spcPct val="140000"/>
-              </a:lnSpc>
-              <a:spcBef>
-                <a:spcPts val="930"/>
-              </a:spcBef>
-              <a:buFont typeface="Corbel" panose="020B0503020204020204" pitchFamily="34" charset="0"/>
-              <a:buChar char="–"/>
-              <a:defRPr sz="1400" kern="1200" spc="150" baseline="0">
-                <a:solidFill>
-                  <a:schemeClr val="tx1">
-                    <a:lumMod val="75000"/>
-                    <a:lumOff val="25000"/>
-                  </a:schemeClr>
-                </a:solidFill>
-                <a:latin typeface="+mn-lt"/>
-                <a:ea typeface="+mn-ea"/>
-                <a:cs typeface="+mn-cs"/>
-              </a:defRPr>
-            </a:lvl4pPr>
-            <a:lvl5pPr marL="0" indent="-320040" algn="l" defTabSz="914400" rtl="0" eaLnBrk="1" latinLnBrk="0" hangingPunct="1">
-              <a:lnSpc>
-                <a:spcPct val="140000"/>
-              </a:lnSpc>
-              <a:spcBef>
-                <a:spcPts val="930"/>
-              </a:spcBef>
-              <a:buFont typeface="Corbel" panose="020B0503020204020204" pitchFamily="34" charset="0"/>
-              <a:buChar char="–"/>
-              <a:defRPr sz="1400" i="1" kern="1200" spc="150" baseline="0">
-                <a:solidFill>
-                  <a:schemeClr val="tx1">
-                    <a:lumMod val="75000"/>
-                    <a:lumOff val="25000"/>
-                  </a:schemeClr>
-                </a:solidFill>
-                <a:latin typeface="+mn-lt"/>
-                <a:ea typeface="+mn-ea"/>
-                <a:cs typeface="+mn-cs"/>
-              </a:defRPr>
-            </a:lvl5pPr>
-            <a:lvl6pPr marL="1920240" indent="-320040" algn="l" defTabSz="914400" rtl="0" eaLnBrk="1" latinLnBrk="0" hangingPunct="1">
-              <a:lnSpc>
-                <a:spcPct val="111000"/>
-              </a:lnSpc>
-              <a:spcBef>
-                <a:spcPts val="930"/>
-              </a:spcBef>
-              <a:buFont typeface="Corbel" panose="020B0503020204020204" pitchFamily="34" charset="0"/>
-              <a:buChar char="–"/>
-              <a:defRPr sz="1400" kern="1200">
-                <a:solidFill>
-                  <a:schemeClr val="accent1">
-                    <a:lumMod val="75000"/>
-                  </a:schemeClr>
-                </a:solidFill>
-                <a:latin typeface="+mn-lt"/>
-                <a:ea typeface="+mn-ea"/>
-                <a:cs typeface="+mn-cs"/>
-              </a:defRPr>
-            </a:lvl6pPr>
-            <a:lvl7pPr marL="2240280" indent="-320040" algn="l" defTabSz="914400" rtl="0" eaLnBrk="1" latinLnBrk="0" hangingPunct="1">
-              <a:lnSpc>
-                <a:spcPct val="111000"/>
-              </a:lnSpc>
-              <a:spcBef>
-                <a:spcPts val="930"/>
-              </a:spcBef>
-              <a:buFont typeface="Corbel" panose="020B0503020204020204" pitchFamily="34" charset="0"/>
-              <a:buChar char="–"/>
-              <a:defRPr sz="1400" i="1" kern="1200">
-                <a:solidFill>
-                  <a:schemeClr val="accent1">
-                    <a:lumMod val="75000"/>
-                  </a:schemeClr>
-                </a:solidFill>
-                <a:latin typeface="+mn-lt"/>
-                <a:ea typeface="+mn-ea"/>
-                <a:cs typeface="+mn-cs"/>
-              </a:defRPr>
-            </a:lvl7pPr>
-            <a:lvl8pPr marL="2560320" indent="-320040" algn="l" defTabSz="914400" rtl="0" eaLnBrk="1" latinLnBrk="0" hangingPunct="1">
-              <a:lnSpc>
-                <a:spcPct val="111000"/>
-              </a:lnSpc>
-              <a:spcBef>
-                <a:spcPts val="930"/>
-              </a:spcBef>
-              <a:buFont typeface="Corbel" panose="020B0503020204020204" pitchFamily="34" charset="0"/>
-              <a:buChar char="–"/>
-              <a:defRPr sz="1400" kern="1200">
-                <a:solidFill>
-                  <a:schemeClr val="accent1">
-                    <a:lumMod val="75000"/>
-                  </a:schemeClr>
-                </a:solidFill>
-                <a:latin typeface="+mn-lt"/>
-                <a:ea typeface="+mn-ea"/>
-                <a:cs typeface="+mn-cs"/>
-              </a:defRPr>
-            </a:lvl8pPr>
-            <a:lvl9pPr marL="2880360" indent="-320040" algn="l" defTabSz="914400" rtl="0" eaLnBrk="1" latinLnBrk="0" hangingPunct="1">
-              <a:lnSpc>
-                <a:spcPct val="111000"/>
-              </a:lnSpc>
-              <a:spcBef>
-                <a:spcPts val="930"/>
-              </a:spcBef>
-              <a:buFont typeface="Corbel" panose="020B0503020204020204" pitchFamily="34" charset="0"/>
-              <a:buChar char="–"/>
-              <a:defRPr sz="1400" i="1" kern="1200">
-                <a:solidFill>
-                  <a:schemeClr val="accent1">
-                    <a:lumMod val="75000"/>
-                  </a:schemeClr>
-                </a:solidFill>
-                <a:latin typeface="+mn-lt"/>
-                <a:ea typeface="+mn-ea"/>
-                <a:cs typeface="+mn-cs"/>
-              </a:defRPr>
-            </a:lvl9pPr>
-          </a:lstStyle>
-          <a:p>
-            <a:pPr marL="285750" indent="-285750">
-              <a:buFont typeface="Arial" panose="020B0604020202020204" pitchFamily="34" charset="0"/>
-              <a:buChar char="•"/>
-            </a:pPr>
-            <a:r>
-              <a:rPr lang="pt-BR" sz="1100" b="0" dirty="0"/>
-              <a:t>Levando em consideração o objetivo final, no qual devemos focar no preço do metro quadrado, e baseando na </a:t>
-            </a:r>
-            <a:r>
-              <a:rPr lang="pt-BR" sz="1100" b="0" i="1" dirty="0" err="1"/>
-              <a:t>Permutation</a:t>
-            </a:r>
-            <a:r>
-              <a:rPr lang="pt-BR" sz="1100" b="0" i="1" dirty="0"/>
-              <a:t> </a:t>
-            </a:r>
-            <a:r>
-              <a:rPr lang="pt-BR" sz="1100" b="0" i="1" dirty="0" err="1"/>
-              <a:t>Importance</a:t>
-            </a:r>
-            <a:r>
-              <a:rPr lang="pt-BR" sz="1100" b="0" dirty="0"/>
-              <a:t>. Consideramos as variáveis que tem mais influência sobre o modelo e normalizamos os dados antes de treinar utilizando </a:t>
-            </a:r>
-            <a:r>
-              <a:rPr lang="pt-BR" sz="1100" b="0" i="1" dirty="0"/>
-              <a:t>Standard </a:t>
-            </a:r>
-            <a:r>
-              <a:rPr lang="pt-BR" sz="1100" b="0" i="1" dirty="0" err="1"/>
-              <a:t>Scaler</a:t>
-            </a:r>
-            <a:r>
-              <a:rPr lang="pt-BR" sz="1100" b="0" dirty="0"/>
-              <a:t>.</a:t>
-            </a:r>
-          </a:p>
-          <a:p>
-            <a:pPr marL="285750" indent="-285750">
-              <a:buFont typeface="Arial" panose="020B0604020202020204" pitchFamily="34" charset="0"/>
-              <a:buChar char="•"/>
-            </a:pPr>
-            <a:endParaRPr lang="pt-BR" sz="1100" b="0" dirty="0"/>
-          </a:p>
-          <a:p>
-            <a:r>
-              <a:rPr lang="pt-BR" sz="1200" dirty="0"/>
-              <a:t>Resultados:</a:t>
-            </a:r>
-          </a:p>
-          <a:p>
-            <a:r>
-              <a:rPr lang="pt-BR" sz="1200" dirty="0"/>
-              <a:t>MSE: </a:t>
-            </a:r>
-            <a:r>
-              <a:rPr lang="pt-BR" sz="1200" b="0" dirty="0"/>
-              <a:t>559656.3353</a:t>
-            </a:r>
-          </a:p>
-          <a:p>
-            <a:r>
-              <a:rPr lang="pt-BR" sz="1200" dirty="0"/>
-              <a:t>RMSE: </a:t>
-            </a:r>
-            <a:r>
-              <a:rPr lang="pt-BR" sz="1200" b="0" dirty="0"/>
-              <a:t>748.10.18</a:t>
-            </a:r>
-          </a:p>
-          <a:p>
-            <a:r>
-              <a:rPr lang="pt-BR" sz="1200" dirty="0"/>
-              <a:t>MAE: </a:t>
-            </a:r>
-            <a:r>
-              <a:rPr lang="pt-BR" sz="1200" b="0" dirty="0"/>
-              <a:t>463.6986</a:t>
-            </a:r>
-          </a:p>
-          <a:p>
-            <a:r>
-              <a:rPr lang="pt-BR" sz="1200" dirty="0"/>
-              <a:t>R²: </a:t>
-            </a:r>
-            <a:r>
-              <a:rPr lang="pt-BR" sz="1200" b="0" dirty="0"/>
-              <a:t>0.4645</a:t>
-            </a:r>
-          </a:p>
-          <a:p>
-            <a:endParaRPr lang="pt-BR" sz="1200" dirty="0"/>
-          </a:p>
-        </p:txBody>
-      </p:sp>
-      <p:pic>
-        <p:nvPicPr>
-          <p:cNvPr id="3" name="Imagem 2">
-            <a:extLst>
-              <a:ext uri="{FF2B5EF4-FFF2-40B4-BE49-F238E27FC236}">
-                <a16:creationId xmlns:a16="http://schemas.microsoft.com/office/drawing/2014/main" id="{DECCAE20-0661-9B3E-49A2-EF48009301AA}"/>
-              </a:ext>
-            </a:extLst>
-          </p:cNvPr>
-          <p:cNvPicPr>
-            <a:picLocks noChangeAspect="1"/>
-          </p:cNvPicPr>
-          <p:nvPr/>
-        </p:nvPicPr>
-        <p:blipFill>
-          <a:blip r:embed="rId2"/>
-          <a:stretch>
-            <a:fillRect/>
-          </a:stretch>
-        </p:blipFill>
-        <p:spPr>
-          <a:xfrm>
-            <a:off x="6336474" y="2576473"/>
-            <a:ext cx="5766821" cy="2964449"/>
-          </a:xfrm>
-          <a:prstGeom prst="rect">
-            <a:avLst/>
-          </a:prstGeom>
-        </p:spPr>
-      </p:pic>
-    </p:spTree>
-    <p:extLst>
-      <p:ext uri="{BB962C8B-B14F-4D97-AF65-F5344CB8AC3E}">
-        <p14:creationId xmlns:p14="http://schemas.microsoft.com/office/powerpoint/2010/main" val="1713545271"/>
       </p:ext>
     </p:extLst>
   </p:cSld>
@@ -15613,8 +16140,12 @@
               <a:buChar char="•"/>
             </a:pPr>
             <a:r>
+              <a:rPr lang="pt-BR" b="1" dirty="0"/>
+              <a:t>Objetivo: </a:t>
+            </a:r>
+            <a:r>
               <a:rPr lang="pt-BR" dirty="0"/>
-              <a:t>Objetivo: Através das informações disponibilizadas, nosso objetivo é estimar o preço do M² dos imóveis, utilizando modelos de regressão linear.</a:t>
+              <a:t>Através das informações disponibilizadas, nosso objetivo é estimar o preço do M² dos imóveis, utilizando modelos de regressão linear.</a:t>
             </a:r>
           </a:p>
           <a:p>
@@ -15622,7 +16153,7 @@
               <a:buFont typeface="Arial" panose="020B0604020202020204" pitchFamily="34" charset="0"/>
               <a:buChar char="•"/>
             </a:pPr>
-            <a:endParaRPr lang="pt-BR" dirty="0"/>
+            <a:endParaRPr lang="pt-BR" u="sng" dirty="0"/>
           </a:p>
         </p:txBody>
       </p:sp>
@@ -16152,10 +16683,26 @@
             </a:pPr>
             <a:r>
               <a:rPr lang="pt-BR" sz="1200" b="0" dirty="0"/>
-              <a:t>Para o subconjunto, escolhemos os imóveis da região Recoleta e Palermo, por serem bairros próximos. Selecionamos também o tipo de imóvel “</a:t>
-            </a:r>
-            <a:r>
-              <a:rPr lang="pt-BR" sz="1200" b="0" dirty="0" err="1"/>
+              <a:t>Para o subconjunto, escolhemos os imóveis da região </a:t>
+            </a:r>
+            <a:r>
+              <a:rPr lang="pt-BR" sz="1200" b="0" i="1" dirty="0"/>
+              <a:t>Recoleta</a:t>
+            </a:r>
+            <a:r>
+              <a:rPr lang="pt-BR" sz="1200" b="0" dirty="0"/>
+              <a:t> e </a:t>
+            </a:r>
+            <a:r>
+              <a:rPr lang="pt-BR" sz="1200" b="0" i="1" dirty="0"/>
+              <a:t>Palermo</a:t>
+            </a:r>
+            <a:r>
+              <a:rPr lang="pt-BR" sz="1200" b="0" dirty="0"/>
+              <a:t>, por serem bairros próximos. Selecionamos também o tipo de imóvel “</a:t>
+            </a:r>
+            <a:r>
+              <a:rPr lang="pt-BR" sz="1200" b="0" i="1" dirty="0" err="1"/>
               <a:t>Apartament</a:t>
             </a:r>
             <a:r>
@@ -18051,15 +18598,6 @@
 </file>
 
 <file path=customXml/item2.xml><?xml version="1.0" encoding="utf-8"?>
-<?mso-contentType ?>
-<FormTemplates xmlns="http://schemas.microsoft.com/sharepoint/v3/contenttype/forms">
-  <Display>DocumentLibraryForm</Display>
-  <Edit>DocumentLibraryForm</Edit>
-  <New>DocumentLibraryForm</New>
-</FormTemplates>
-</file>
-
-<file path=customXml/item3.xml><?xml version="1.0" encoding="utf-8"?>
 <p:properties xmlns:p="http://schemas.microsoft.com/office/2006/metadata/properties" xmlns:xsi="http://www.w3.org/2001/XMLSchema-instance" xmlns:pc="http://schemas.microsoft.com/office/infopath/2007/PartnerControls">
   <documentManagement>
     <_ip_UnifiedCompliancePolicyUIAction xmlns="http://schemas.microsoft.com/sharepoint/v3" xsi:nil="true"/>
@@ -18076,6 +18614,15 @@
     <MediaServiceKeyPoints xmlns="71af3243-3dd4-4a8d-8c0d-dd76da1f02a5" xsi:nil="true"/>
   </documentManagement>
 </p:properties>
+</file>
+
+<file path=customXml/item3.xml><?xml version="1.0" encoding="utf-8"?>
+<?mso-contentType ?>
+<FormTemplates xmlns="http://schemas.microsoft.com/sharepoint/v3/contenttype/forms">
+  <Display>DocumentLibraryForm</Display>
+  <Edit>DocumentLibraryForm</Edit>
+  <New>DocumentLibraryForm</New>
+</FormTemplates>
 </file>
 
 <file path=customXml/itemProps1.xml><?xml version="1.0" encoding="utf-8"?>
@@ -18100,14 +18647,6 @@
 </file>
 
 <file path=customXml/itemProps2.xml><?xml version="1.0" encoding="utf-8"?>
-<ds:datastoreItem xmlns:ds="http://schemas.openxmlformats.org/officeDocument/2006/customXml" ds:itemID="{100F1594-3EA9-4B35-B72A-00D8B89F015B}">
-  <ds:schemaRefs>
-    <ds:schemaRef ds:uri="http://schemas.microsoft.com/sharepoint/v3/contenttype/forms"/>
-  </ds:schemaRefs>
-</ds:datastoreItem>
-</file>
-
-<file path=customXml/itemProps3.xml><?xml version="1.0" encoding="utf-8"?>
 <ds:datastoreItem xmlns:ds="http://schemas.openxmlformats.org/officeDocument/2006/customXml" ds:itemID="{9BF9B764-6365-43A2-B92A-B9C4DD6E9B23}">
   <ds:schemaRefs>
     <ds:schemaRef ds:uri="http://schemas.microsoft.com/office/2006/metadata/properties"/>
@@ -18119,8 +18658,17 @@
 </ds:datastoreItem>
 </file>
 
+<file path=customXml/itemProps3.xml><?xml version="1.0" encoding="utf-8"?>
+<ds:datastoreItem xmlns:ds="http://schemas.openxmlformats.org/officeDocument/2006/customXml" ds:itemID="{100F1594-3EA9-4B35-B72A-00D8B89F015B}">
+  <ds:schemaRefs>
+    <ds:schemaRef ds:uri="http://schemas.microsoft.com/sharepoint/v3/contenttype/forms"/>
+  </ds:schemaRefs>
+</ds:datastoreItem>
+</file>
+
 <file path=docMetadata/LabelInfo.xml><?xml version="1.0" encoding="utf-8"?>
 <clbl:labelList xmlns:clbl="http://schemas.microsoft.com/office/2020/mipLabelMetadata">
+  <clbl:label id="{5fae8262-b78e-4366-8929-a5d6aac95320}" enabled="1" method="Standard" siteId="{cf36141c-ddd7-45a7-b073-111f66d0b30c}" contentBits="0" removed="0"/>
   <clbl:label id="{72f988bf-86f1-41af-91ab-2d7cd011db47}" enabled="0" method="" siteId="{72f988bf-86f1-41af-91ab-2d7cd011db47}" removed="1"/>
 </clbl:labelList>
 </file>
</xml_diff>